<commit_message>
-Add missing power point slides and their updates
</commit_message>
<xml_diff>
--- a/Power Point Slides/Go vs Python.pptx
+++ b/Power Point Slides/Go vs Python.pptx
@@ -5,10 +5,10 @@
     <p:sldMasterId id="2147483648" r:id="rId4"/>
   </p:sldMasterIdLst>
   <p:notesMasterIdLst>
-    <p:notesMasterId r:id="rId13"/>
+    <p:notesMasterId r:id="rId14"/>
   </p:notesMasterIdLst>
   <p:handoutMasterIdLst>
-    <p:handoutMasterId r:id="rId14"/>
+    <p:handoutMasterId r:id="rId15"/>
   </p:handoutMasterIdLst>
   <p:sldIdLst>
     <p:sldId id="4215" r:id="rId5"/>
@@ -18,7 +18,8 @@
     <p:sldId id="4213" r:id="rId9"/>
     <p:sldId id="4221" r:id="rId10"/>
     <p:sldId id="4222" r:id="rId11"/>
-    <p:sldId id="4207" r:id="rId12"/>
+    <p:sldId id="4223" r:id="rId12"/>
+    <p:sldId id="4207" r:id="rId13"/>
   </p:sldIdLst>
   <p:sldSz cx="12192000" cy="6858000"/>
   <p:notesSz cx="6858000" cy="9144000"/>
@@ -119,7 +120,7 @@
   </p:defaultTextStyle>
   <p:extLst>
     <p:ext uri="{EFAFB233-063F-42B5-8137-9DF3F51BA10A}">
-      <p15:sldGuideLst xmlns:p15="http://schemas.microsoft.com/office/powerpoint/2012/main" xmlns="">
+      <p15:sldGuideLst xmlns="" xmlns:p15="http://schemas.microsoft.com/office/powerpoint/2012/main">
         <p15:guide id="1" orient="horz" pos="2160">
           <p15:clr>
             <a:srgbClr val="A4A3A4"/>
@@ -133,7 +134,7 @@
       </p15:sldGuideLst>
     </p:ext>
     <p:ext uri="{2D200454-40CA-4A62-9FC3-DE9A4176ACB9}">
-      <p15:notesGuideLst xmlns:p15="http://schemas.microsoft.com/office/powerpoint/2012/main" xmlns=""/>
+      <p15:notesGuideLst xmlns="" xmlns:p15="http://schemas.microsoft.com/office/powerpoint/2012/main"/>
     </p:ext>
   </p:extLst>
 </p:presentation>
@@ -175,7 +176,7 @@
           <p:cNvPr id="2" name="Header Placeholder 1">
             <a:extLst>
               <a:ext uri="{FF2B5EF4-FFF2-40B4-BE49-F238E27FC236}">
-                <a16:creationId xmlns:a16="http://schemas.microsoft.com/office/drawing/2014/main" xmlns="" id="{273365B8-2511-D040-9EAC-EAD5E1AB0259}"/>
+                <a16:creationId xmlns="" xmlns:a16="http://schemas.microsoft.com/office/drawing/2014/main" id="{273365B8-2511-D040-9EAC-EAD5E1AB0259}"/>
               </a:ext>
             </a:extLst>
           </p:cNvPr>
@@ -212,7 +213,7 @@
           <p:cNvPr id="3" name="Date Placeholder 2">
             <a:extLst>
               <a:ext uri="{FF2B5EF4-FFF2-40B4-BE49-F238E27FC236}">
-                <a16:creationId xmlns:a16="http://schemas.microsoft.com/office/drawing/2014/main" xmlns="" id="{FA53D240-1E32-F546-97BB-3F81E4C94127}"/>
+                <a16:creationId xmlns="" xmlns:a16="http://schemas.microsoft.com/office/drawing/2014/main" id="{FA53D240-1E32-F546-97BB-3F81E4C94127}"/>
               </a:ext>
             </a:extLst>
           </p:cNvPr>
@@ -243,7 +244,7 @@
             <a:fld id="{5E46B522-554D-304C-B062-B3D14C953F88}" type="datetimeFigureOut">
               <a:rPr lang="en-US" smtClean="0"/>
               <a:pPr/>
-              <a:t>10/16/2024</a:t>
+              <a:t>10/29/2024</a:t>
             </a:fld>
             <a:endParaRPr lang="en-US"/>
           </a:p>
@@ -254,7 +255,7 @@
           <p:cNvPr id="4" name="Footer Placeholder 3">
             <a:extLst>
               <a:ext uri="{FF2B5EF4-FFF2-40B4-BE49-F238E27FC236}">
-                <a16:creationId xmlns:a16="http://schemas.microsoft.com/office/drawing/2014/main" xmlns="" id="{0FB1C412-F491-B74E-A609-73034009A4FE}"/>
+                <a16:creationId xmlns="" xmlns:a16="http://schemas.microsoft.com/office/drawing/2014/main" id="{0FB1C412-F491-B74E-A609-73034009A4FE}"/>
               </a:ext>
             </a:extLst>
           </p:cNvPr>
@@ -291,7 +292,7 @@
           <p:cNvPr id="5" name="Slide Number Placeholder 4">
             <a:extLst>
               <a:ext uri="{FF2B5EF4-FFF2-40B4-BE49-F238E27FC236}">
-                <a16:creationId xmlns:a16="http://schemas.microsoft.com/office/drawing/2014/main" xmlns="" id="{0B72CE36-DEB7-BF4C-A096-B6E5D881FA61}"/>
+                <a16:creationId xmlns="" xmlns:a16="http://schemas.microsoft.com/office/drawing/2014/main" id="{0B72CE36-DEB7-BF4C-A096-B6E5D881FA61}"/>
               </a:ext>
             </a:extLst>
           </p:cNvPr>
@@ -331,7 +332,7 @@
     </p:spTree>
     <p:extLst>
       <p:ext uri="{BB962C8B-B14F-4D97-AF65-F5344CB8AC3E}">
-        <p14:creationId xmlns:p14="http://schemas.microsoft.com/office/powerpoint/2010/main" xmlns="" val="2867797386"/>
+        <p14:creationId xmlns="" xmlns:p14="http://schemas.microsoft.com/office/powerpoint/2010/main" val="2867797386"/>
       </p:ext>
     </p:extLst>
   </p:cSld>
@@ -422,7 +423,7 @@
             <a:fld id="{5BA413F0-8702-4C58-A1DC-FE228FE832D3}" type="datetimeFigureOut">
               <a:rPr lang="en-US" smtClean="0"/>
               <a:pPr/>
-              <a:t>10/16/2024</a:t>
+              <a:t>10/29/2024</a:t>
             </a:fld>
             <a:endParaRPr lang="en-US"/>
           </a:p>
@@ -590,7 +591,7 @@
     </p:spTree>
     <p:extLst>
       <p:ext uri="{BB962C8B-B14F-4D97-AF65-F5344CB8AC3E}">
-        <p14:creationId xmlns:p14="http://schemas.microsoft.com/office/powerpoint/2010/main" xmlns="" val="2039652292"/>
+        <p14:creationId xmlns="" xmlns:p14="http://schemas.microsoft.com/office/powerpoint/2010/main" val="2039652292"/>
       </p:ext>
     </p:extLst>
   </p:cSld>
@@ -712,7 +713,7 @@
           <p:cNvPr id="8" name="Picture 7">
             <a:extLst>
               <a:ext uri="{FF2B5EF4-FFF2-40B4-BE49-F238E27FC236}">
-                <a16:creationId xmlns:a16="http://schemas.microsoft.com/office/drawing/2014/main" xmlns="" id="{DCB70024-7CB7-C54A-B281-8ABD3CB28A78}"/>
+                <a16:creationId xmlns="" xmlns:a16="http://schemas.microsoft.com/office/drawing/2014/main" id="{DCB70024-7CB7-C54A-B281-8ABD3CB28A78}"/>
               </a:ext>
             </a:extLst>
           </p:cNvPr>
@@ -742,7 +743,7 @@
           <p:cNvPr id="2" name="Title 1">
             <a:extLst>
               <a:ext uri="{FF2B5EF4-FFF2-40B4-BE49-F238E27FC236}">
-                <a16:creationId xmlns:a16="http://schemas.microsoft.com/office/drawing/2014/main" xmlns="" id="{31D28376-80FC-AA47-983D-5AA4ADF9D4A4}"/>
+                <a16:creationId xmlns="" xmlns:a16="http://schemas.microsoft.com/office/drawing/2014/main" id="{31D28376-80FC-AA47-983D-5AA4ADF9D4A4}"/>
               </a:ext>
             </a:extLst>
           </p:cNvPr>
@@ -785,7 +786,7 @@
           <p:cNvPr id="13" name="Text Placeholder 3">
             <a:extLst>
               <a:ext uri="{FF2B5EF4-FFF2-40B4-BE49-F238E27FC236}">
-                <a16:creationId xmlns:a16="http://schemas.microsoft.com/office/drawing/2014/main" xmlns="" id="{19FEBE34-6786-634C-97C1-F56667D4943E}"/>
+                <a16:creationId xmlns="" xmlns:a16="http://schemas.microsoft.com/office/drawing/2014/main" id="{19FEBE34-6786-634C-97C1-F56667D4943E}"/>
               </a:ext>
             </a:extLst>
           </p:cNvPr>
@@ -863,7 +864,7 @@
           <p:cNvPr id="14" name="Picture 13">
             <a:extLst>
               <a:ext uri="{FF2B5EF4-FFF2-40B4-BE49-F238E27FC236}">
-                <a16:creationId xmlns:a16="http://schemas.microsoft.com/office/drawing/2014/main" xmlns="" id="{FA18BCDF-85A9-7E46-B854-763E07701F49}"/>
+                <a16:creationId xmlns="" xmlns:a16="http://schemas.microsoft.com/office/drawing/2014/main" id="{FA18BCDF-85A9-7E46-B854-763E07701F49}"/>
               </a:ext>
             </a:extLst>
           </p:cNvPr>
@@ -891,7 +892,7 @@
     </p:spTree>
     <p:extLst>
       <p:ext uri="{BB962C8B-B14F-4D97-AF65-F5344CB8AC3E}">
-        <p14:creationId xmlns:p14="http://schemas.microsoft.com/office/powerpoint/2010/main" xmlns="" val="3242109002"/>
+        <p14:creationId xmlns="" xmlns:p14="http://schemas.microsoft.com/office/powerpoint/2010/main" val="3242109002"/>
       </p:ext>
     </p:extLst>
   </p:cSld>
@@ -899,7 +900,7 @@
     <a:masterClrMapping/>
   </p:clrMapOvr>
   <mc:AlternateContent xmlns:mc="http://schemas.openxmlformats.org/markup-compatibility/2006">
-    <mc:Choice xmlns:p14="http://schemas.microsoft.com/office/powerpoint/2010/main" xmlns="" Requires="p14">
+    <mc:Choice xmlns="" xmlns:p14="http://schemas.microsoft.com/office/powerpoint/2010/main" Requires="p14">
       <p:transition spd="slow" p14:dur="2000" advClick="0" advTm="5000"/>
     </mc:Choice>
     <mc:Fallback>
@@ -931,7 +932,7 @@
           <p:cNvPr id="3" name="Rectangle 2">
             <a:extLst>
               <a:ext uri="{FF2B5EF4-FFF2-40B4-BE49-F238E27FC236}">
-                <a16:creationId xmlns:a16="http://schemas.microsoft.com/office/drawing/2014/main" xmlns="" id="{312D6159-2173-3548-874C-452958A85DF6}"/>
+                <a16:creationId xmlns="" xmlns:a16="http://schemas.microsoft.com/office/drawing/2014/main" id="{312D6159-2173-3548-874C-452958A85DF6}"/>
               </a:ext>
             </a:extLst>
           </p:cNvPr>
@@ -991,7 +992,7 @@
           <p:cNvPr id="9" name="Picture 8">
             <a:extLst>
               <a:ext uri="{FF2B5EF4-FFF2-40B4-BE49-F238E27FC236}">
-                <a16:creationId xmlns:a16="http://schemas.microsoft.com/office/drawing/2014/main" xmlns="" id="{7D240A3C-FB87-A849-BF43-94582DC1113D}"/>
+                <a16:creationId xmlns="" xmlns:a16="http://schemas.microsoft.com/office/drawing/2014/main" id="{7D240A3C-FB87-A849-BF43-94582DC1113D}"/>
               </a:ext>
             </a:extLst>
           </p:cNvPr>
@@ -1021,7 +1022,7 @@
           <p:cNvPr id="5" name="Parallelogram 4">
             <a:extLst>
               <a:ext uri="{FF2B5EF4-FFF2-40B4-BE49-F238E27FC236}">
-                <a16:creationId xmlns:a16="http://schemas.microsoft.com/office/drawing/2014/main" xmlns="" id="{044CF2C6-1EB8-C545-A5EB-AF5DD2B28349}"/>
+                <a16:creationId xmlns="" xmlns:a16="http://schemas.microsoft.com/office/drawing/2014/main" id="{044CF2C6-1EB8-C545-A5EB-AF5DD2B28349}"/>
               </a:ext>
             </a:extLst>
           </p:cNvPr>
@@ -1077,7 +1078,7 @@
           <p:cNvPr id="11" name="Parallelogram 10">
             <a:extLst>
               <a:ext uri="{FF2B5EF4-FFF2-40B4-BE49-F238E27FC236}">
-                <a16:creationId xmlns:a16="http://schemas.microsoft.com/office/drawing/2014/main" xmlns="" id="{82DF6964-073F-A741-8B17-E0E690F4DF59}"/>
+                <a16:creationId xmlns="" xmlns:a16="http://schemas.microsoft.com/office/drawing/2014/main" id="{82DF6964-073F-A741-8B17-E0E690F4DF59}"/>
               </a:ext>
             </a:extLst>
           </p:cNvPr>
@@ -1133,7 +1134,7 @@
           <p:cNvPr id="12" name="Picture 11">
             <a:extLst>
               <a:ext uri="{FF2B5EF4-FFF2-40B4-BE49-F238E27FC236}">
-                <a16:creationId xmlns:a16="http://schemas.microsoft.com/office/drawing/2014/main" xmlns="" id="{5468F2ED-84BD-5740-B8E1-A6C010A50528}"/>
+                <a16:creationId xmlns="" xmlns:a16="http://schemas.microsoft.com/office/drawing/2014/main" id="{5468F2ED-84BD-5740-B8E1-A6C010A50528}"/>
               </a:ext>
             </a:extLst>
           </p:cNvPr>
@@ -1163,7 +1164,7 @@
           <p:cNvPr id="2" name="Title 1">
             <a:extLst>
               <a:ext uri="{FF2B5EF4-FFF2-40B4-BE49-F238E27FC236}">
-                <a16:creationId xmlns:a16="http://schemas.microsoft.com/office/drawing/2014/main" xmlns="" id="{31D28376-80FC-AA47-983D-5AA4ADF9D4A4}"/>
+                <a16:creationId xmlns="" xmlns:a16="http://schemas.microsoft.com/office/drawing/2014/main" id="{31D28376-80FC-AA47-983D-5AA4ADF9D4A4}"/>
               </a:ext>
             </a:extLst>
           </p:cNvPr>
@@ -1206,7 +1207,7 @@
           <p:cNvPr id="14" name="Picture 13">
             <a:extLst>
               <a:ext uri="{FF2B5EF4-FFF2-40B4-BE49-F238E27FC236}">
-                <a16:creationId xmlns:a16="http://schemas.microsoft.com/office/drawing/2014/main" xmlns="" id="{49AFA3BC-2111-0D40-8CDB-D02BC1839772}"/>
+                <a16:creationId xmlns="" xmlns:a16="http://schemas.microsoft.com/office/drawing/2014/main" id="{49AFA3BC-2111-0D40-8CDB-D02BC1839772}"/>
               </a:ext>
             </a:extLst>
           </p:cNvPr>
@@ -1236,7 +1237,7 @@
           <p:cNvPr id="10" name="Picture 9">
             <a:extLst>
               <a:ext uri="{FF2B5EF4-FFF2-40B4-BE49-F238E27FC236}">
-                <a16:creationId xmlns:a16="http://schemas.microsoft.com/office/drawing/2014/main" xmlns="" id="{3E633816-E054-8940-AF72-870913AF2214}"/>
+                <a16:creationId xmlns="" xmlns:a16="http://schemas.microsoft.com/office/drawing/2014/main" id="{3E633816-E054-8940-AF72-870913AF2214}"/>
               </a:ext>
             </a:extLst>
           </p:cNvPr>
@@ -1266,7 +1267,7 @@
           <p:cNvPr id="6" name="Parallelogram 5">
             <a:extLst>
               <a:ext uri="{FF2B5EF4-FFF2-40B4-BE49-F238E27FC236}">
-                <a16:creationId xmlns:a16="http://schemas.microsoft.com/office/drawing/2014/main" xmlns="" id="{8A924114-BABB-6746-9878-D1B4CE11052D}"/>
+                <a16:creationId xmlns="" xmlns:a16="http://schemas.microsoft.com/office/drawing/2014/main" id="{8A924114-BABB-6746-9878-D1B4CE11052D}"/>
               </a:ext>
             </a:extLst>
           </p:cNvPr>
@@ -1330,7 +1331,7 @@
           <p:cNvPr id="13" name="Text Placeholder 3">
             <a:extLst>
               <a:ext uri="{FF2B5EF4-FFF2-40B4-BE49-F238E27FC236}">
-                <a16:creationId xmlns:a16="http://schemas.microsoft.com/office/drawing/2014/main" xmlns="" id="{19FEBE34-6786-634C-97C1-F56667D4943E}"/>
+                <a16:creationId xmlns="" xmlns:a16="http://schemas.microsoft.com/office/drawing/2014/main" id="{19FEBE34-6786-634C-97C1-F56667D4943E}"/>
               </a:ext>
             </a:extLst>
           </p:cNvPr>
@@ -1406,7 +1407,7 @@
     </p:spTree>
     <p:extLst>
       <p:ext uri="{BB962C8B-B14F-4D97-AF65-F5344CB8AC3E}">
-        <p14:creationId xmlns:p14="http://schemas.microsoft.com/office/powerpoint/2010/main" xmlns="" val="1934555395"/>
+        <p14:creationId xmlns="" xmlns:p14="http://schemas.microsoft.com/office/powerpoint/2010/main" val="1934555395"/>
       </p:ext>
     </p:extLst>
   </p:cSld>
@@ -1414,7 +1415,7 @@
     <a:masterClrMapping/>
   </p:clrMapOvr>
   <mc:AlternateContent xmlns:mc="http://schemas.openxmlformats.org/markup-compatibility/2006">
-    <mc:Choice xmlns:p14="http://schemas.microsoft.com/office/powerpoint/2010/main" xmlns="" Requires="p14">
+    <mc:Choice xmlns="" xmlns:p14="http://schemas.microsoft.com/office/powerpoint/2010/main" Requires="p14">
       <p:transition spd="slow" p14:dur="2000" advClick="0" advTm="5000"/>
     </mc:Choice>
     <mc:Fallback>
@@ -1446,7 +1447,7 @@
           <p:cNvPr id="7" name="Picture 6">
             <a:extLst>
               <a:ext uri="{FF2B5EF4-FFF2-40B4-BE49-F238E27FC236}">
-                <a16:creationId xmlns:a16="http://schemas.microsoft.com/office/drawing/2014/main" xmlns="" id="{BCA450C1-58BE-6E4E-9CBF-0FB691FD755E}"/>
+                <a16:creationId xmlns="" xmlns:a16="http://schemas.microsoft.com/office/drawing/2014/main" id="{BCA450C1-58BE-6E4E-9CBF-0FB691FD755E}"/>
               </a:ext>
             </a:extLst>
           </p:cNvPr>
@@ -1476,7 +1477,7 @@
           <p:cNvPr id="14" name="Picture 13">
             <a:extLst>
               <a:ext uri="{FF2B5EF4-FFF2-40B4-BE49-F238E27FC236}">
-                <a16:creationId xmlns:a16="http://schemas.microsoft.com/office/drawing/2014/main" xmlns="" id="{0CFBEA58-BD22-D24F-B512-8BA514AB9008}"/>
+                <a16:creationId xmlns="" xmlns:a16="http://schemas.microsoft.com/office/drawing/2014/main" id="{0CFBEA58-BD22-D24F-B512-8BA514AB9008}"/>
               </a:ext>
             </a:extLst>
           </p:cNvPr>
@@ -1506,7 +1507,7 @@
           <p:cNvPr id="2" name="Title 1">
             <a:extLst>
               <a:ext uri="{FF2B5EF4-FFF2-40B4-BE49-F238E27FC236}">
-                <a16:creationId xmlns:a16="http://schemas.microsoft.com/office/drawing/2014/main" xmlns="" id="{31D28376-80FC-AA47-983D-5AA4ADF9D4A4}"/>
+                <a16:creationId xmlns="" xmlns:a16="http://schemas.microsoft.com/office/drawing/2014/main" id="{31D28376-80FC-AA47-983D-5AA4ADF9D4A4}"/>
               </a:ext>
             </a:extLst>
           </p:cNvPr>
@@ -1547,7 +1548,7 @@
           <p:cNvPr id="13" name="Text Placeholder 3">
             <a:extLst>
               <a:ext uri="{FF2B5EF4-FFF2-40B4-BE49-F238E27FC236}">
-                <a16:creationId xmlns:a16="http://schemas.microsoft.com/office/drawing/2014/main" xmlns="" id="{19FEBE34-6786-634C-97C1-F56667D4943E}"/>
+                <a16:creationId xmlns="" xmlns:a16="http://schemas.microsoft.com/office/drawing/2014/main" id="{19FEBE34-6786-634C-97C1-F56667D4943E}"/>
               </a:ext>
             </a:extLst>
           </p:cNvPr>
@@ -1625,7 +1626,7 @@
     </p:spTree>
     <p:extLst>
       <p:ext uri="{BB962C8B-B14F-4D97-AF65-F5344CB8AC3E}">
-        <p14:creationId xmlns:p14="http://schemas.microsoft.com/office/powerpoint/2010/main" xmlns="" val="3633923498"/>
+        <p14:creationId xmlns="" xmlns:p14="http://schemas.microsoft.com/office/powerpoint/2010/main" val="3633923498"/>
       </p:ext>
     </p:extLst>
   </p:cSld>
@@ -1633,7 +1634,7 @@
     <a:masterClrMapping/>
   </p:clrMapOvr>
   <mc:AlternateContent xmlns:mc="http://schemas.openxmlformats.org/markup-compatibility/2006">
-    <mc:Choice xmlns:p14="http://schemas.microsoft.com/office/powerpoint/2010/main" xmlns="" Requires="p14">
+    <mc:Choice xmlns="" xmlns:p14="http://schemas.microsoft.com/office/powerpoint/2010/main" Requires="p14">
       <p:transition spd="slow" p14:dur="2000" advClick="0" advTm="5000"/>
     </mc:Choice>
     <mc:Fallback>
@@ -1665,7 +1666,7 @@
           <p:cNvPr id="4" name="Picture 3">
             <a:extLst>
               <a:ext uri="{FF2B5EF4-FFF2-40B4-BE49-F238E27FC236}">
-                <a16:creationId xmlns:a16="http://schemas.microsoft.com/office/drawing/2014/main" xmlns="" id="{7216A11E-EB76-6A4D-AE29-9332E8815DF5}"/>
+                <a16:creationId xmlns="" xmlns:a16="http://schemas.microsoft.com/office/drawing/2014/main" id="{7216A11E-EB76-6A4D-AE29-9332E8815DF5}"/>
               </a:ext>
             </a:extLst>
           </p:cNvPr>
@@ -1695,7 +1696,7 @@
           <p:cNvPr id="14" name="Picture 13">
             <a:extLst>
               <a:ext uri="{FF2B5EF4-FFF2-40B4-BE49-F238E27FC236}">
-                <a16:creationId xmlns:a16="http://schemas.microsoft.com/office/drawing/2014/main" xmlns="" id="{05601A25-21DD-1E4D-AFB7-71CAFF449160}"/>
+                <a16:creationId xmlns="" xmlns:a16="http://schemas.microsoft.com/office/drawing/2014/main" id="{05601A25-21DD-1E4D-AFB7-71CAFF449160}"/>
               </a:ext>
             </a:extLst>
           </p:cNvPr>
@@ -1725,7 +1726,7 @@
           <p:cNvPr id="5" name="Slide Number Placeholder 4">
             <a:extLst>
               <a:ext uri="{FF2B5EF4-FFF2-40B4-BE49-F238E27FC236}">
-                <a16:creationId xmlns:a16="http://schemas.microsoft.com/office/drawing/2014/main" xmlns="" id="{E766DCC1-03BD-8D48-975F-E848D408E17A}"/>
+                <a16:creationId xmlns="" xmlns:a16="http://schemas.microsoft.com/office/drawing/2014/main" id="{E766DCC1-03BD-8D48-975F-E848D408E17A}"/>
               </a:ext>
             </a:extLst>
           </p:cNvPr>
@@ -1768,7 +1769,7 @@
           <p:cNvPr id="13" name="Picture 12">
             <a:extLst>
               <a:ext uri="{FF2B5EF4-FFF2-40B4-BE49-F238E27FC236}">
-                <a16:creationId xmlns:a16="http://schemas.microsoft.com/office/drawing/2014/main" xmlns="" id="{0FC8616F-1480-6F40-B21A-CC2BA2C45BED}"/>
+                <a16:creationId xmlns="" xmlns:a16="http://schemas.microsoft.com/office/drawing/2014/main" id="{0FC8616F-1480-6F40-B21A-CC2BA2C45BED}"/>
               </a:ext>
             </a:extLst>
           </p:cNvPr>
@@ -1798,7 +1799,7 @@
           <p:cNvPr id="8" name="Text Placeholder 3">
             <a:extLst>
               <a:ext uri="{FF2B5EF4-FFF2-40B4-BE49-F238E27FC236}">
-                <a16:creationId xmlns:a16="http://schemas.microsoft.com/office/drawing/2014/main" xmlns="" id="{28EA1C4D-6527-1A41-B80D-82366B12758F}"/>
+                <a16:creationId xmlns="" xmlns:a16="http://schemas.microsoft.com/office/drawing/2014/main" id="{28EA1C4D-6527-1A41-B80D-82366B12758F}"/>
               </a:ext>
             </a:extLst>
           </p:cNvPr>
@@ -1891,7 +1892,7 @@
           <p:cNvPr id="9" name="Text Placeholder 3">
             <a:extLst>
               <a:ext uri="{FF2B5EF4-FFF2-40B4-BE49-F238E27FC236}">
-                <a16:creationId xmlns:a16="http://schemas.microsoft.com/office/drawing/2014/main" xmlns="" id="{C9953FA3-FF52-2645-8039-6B173888D710}"/>
+                <a16:creationId xmlns="" xmlns:a16="http://schemas.microsoft.com/office/drawing/2014/main" id="{C9953FA3-FF52-2645-8039-6B173888D710}"/>
               </a:ext>
             </a:extLst>
           </p:cNvPr>
@@ -1973,7 +1974,7 @@
           <p:cNvPr id="10" name="Title 1">
             <a:extLst>
               <a:ext uri="{FF2B5EF4-FFF2-40B4-BE49-F238E27FC236}">
-                <a16:creationId xmlns:a16="http://schemas.microsoft.com/office/drawing/2014/main" xmlns="" id="{4AE68015-0AAC-0C46-8F76-36477CC385DE}"/>
+                <a16:creationId xmlns="" xmlns:a16="http://schemas.microsoft.com/office/drawing/2014/main" id="{4AE68015-0AAC-0C46-8F76-36477CC385DE}"/>
               </a:ext>
             </a:extLst>
           </p:cNvPr>
@@ -2016,7 +2017,7 @@
           <p:cNvPr id="11" name="Text Placeholder 3">
             <a:extLst>
               <a:ext uri="{FF2B5EF4-FFF2-40B4-BE49-F238E27FC236}">
-                <a16:creationId xmlns:a16="http://schemas.microsoft.com/office/drawing/2014/main" xmlns="" id="{169BBA5D-EECF-4043-90D1-DD6BB50A5390}"/>
+                <a16:creationId xmlns="" xmlns:a16="http://schemas.microsoft.com/office/drawing/2014/main" id="{169BBA5D-EECF-4043-90D1-DD6BB50A5390}"/>
               </a:ext>
             </a:extLst>
           </p:cNvPr>
@@ -2093,7 +2094,7 @@
     </p:spTree>
     <p:extLst>
       <p:ext uri="{BB962C8B-B14F-4D97-AF65-F5344CB8AC3E}">
-        <p14:creationId xmlns:p14="http://schemas.microsoft.com/office/powerpoint/2010/main" xmlns="" val="3416040107"/>
+        <p14:creationId xmlns="" xmlns:p14="http://schemas.microsoft.com/office/powerpoint/2010/main" val="3416040107"/>
       </p:ext>
     </p:extLst>
   </p:cSld>
@@ -2101,7 +2102,7 @@
     <a:masterClrMapping/>
   </p:clrMapOvr>
   <mc:AlternateContent xmlns:mc="http://schemas.openxmlformats.org/markup-compatibility/2006">
-    <mc:Choice xmlns:p14="http://schemas.microsoft.com/office/powerpoint/2010/main" xmlns="" Requires="p14">
+    <mc:Choice xmlns="" xmlns:p14="http://schemas.microsoft.com/office/powerpoint/2010/main" Requires="p14">
       <p:transition spd="slow" p14:dur="2000" advClick="0" advTm="5000"/>
     </mc:Choice>
     <mc:Fallback>
@@ -2133,7 +2134,7 @@
           <p:cNvPr id="7" name="Picture 6">
             <a:extLst>
               <a:ext uri="{FF2B5EF4-FFF2-40B4-BE49-F238E27FC236}">
-                <a16:creationId xmlns:a16="http://schemas.microsoft.com/office/drawing/2014/main" xmlns="" id="{A4D44DAB-CF6D-0148-B76F-DB4FDFF7BE3C}"/>
+                <a16:creationId xmlns="" xmlns:a16="http://schemas.microsoft.com/office/drawing/2014/main" id="{A4D44DAB-CF6D-0148-B76F-DB4FDFF7BE3C}"/>
               </a:ext>
             </a:extLst>
           </p:cNvPr>
@@ -2163,7 +2164,7 @@
           <p:cNvPr id="14" name="Picture 13">
             <a:extLst>
               <a:ext uri="{FF2B5EF4-FFF2-40B4-BE49-F238E27FC236}">
-                <a16:creationId xmlns:a16="http://schemas.microsoft.com/office/drawing/2014/main" xmlns="" id="{05601A25-21DD-1E4D-AFB7-71CAFF449160}"/>
+                <a16:creationId xmlns="" xmlns:a16="http://schemas.microsoft.com/office/drawing/2014/main" id="{05601A25-21DD-1E4D-AFB7-71CAFF449160}"/>
               </a:ext>
             </a:extLst>
           </p:cNvPr>
@@ -2193,7 +2194,7 @@
           <p:cNvPr id="5" name="Slide Number Placeholder 4">
             <a:extLst>
               <a:ext uri="{FF2B5EF4-FFF2-40B4-BE49-F238E27FC236}">
-                <a16:creationId xmlns:a16="http://schemas.microsoft.com/office/drawing/2014/main" xmlns="" id="{E766DCC1-03BD-8D48-975F-E848D408E17A}"/>
+                <a16:creationId xmlns="" xmlns:a16="http://schemas.microsoft.com/office/drawing/2014/main" id="{E766DCC1-03BD-8D48-975F-E848D408E17A}"/>
               </a:ext>
             </a:extLst>
           </p:cNvPr>
@@ -2236,7 +2237,7 @@
           <p:cNvPr id="13" name="Picture 12">
             <a:extLst>
               <a:ext uri="{FF2B5EF4-FFF2-40B4-BE49-F238E27FC236}">
-                <a16:creationId xmlns:a16="http://schemas.microsoft.com/office/drawing/2014/main" xmlns="" id="{0FC8616F-1480-6F40-B21A-CC2BA2C45BED}"/>
+                <a16:creationId xmlns="" xmlns:a16="http://schemas.microsoft.com/office/drawing/2014/main" id="{0FC8616F-1480-6F40-B21A-CC2BA2C45BED}"/>
               </a:ext>
             </a:extLst>
           </p:cNvPr>
@@ -2266,7 +2267,7 @@
           <p:cNvPr id="8" name="Text Placeholder 3">
             <a:extLst>
               <a:ext uri="{FF2B5EF4-FFF2-40B4-BE49-F238E27FC236}">
-                <a16:creationId xmlns:a16="http://schemas.microsoft.com/office/drawing/2014/main" xmlns="" id="{28EA1C4D-6527-1A41-B80D-82366B12758F}"/>
+                <a16:creationId xmlns="" xmlns:a16="http://schemas.microsoft.com/office/drawing/2014/main" id="{28EA1C4D-6527-1A41-B80D-82366B12758F}"/>
               </a:ext>
             </a:extLst>
           </p:cNvPr>
@@ -2359,7 +2360,7 @@
           <p:cNvPr id="10" name="Title 1">
             <a:extLst>
               <a:ext uri="{FF2B5EF4-FFF2-40B4-BE49-F238E27FC236}">
-                <a16:creationId xmlns:a16="http://schemas.microsoft.com/office/drawing/2014/main" xmlns="" id="{4AE68015-0AAC-0C46-8F76-36477CC385DE}"/>
+                <a16:creationId xmlns="" xmlns:a16="http://schemas.microsoft.com/office/drawing/2014/main" id="{4AE68015-0AAC-0C46-8F76-36477CC385DE}"/>
               </a:ext>
             </a:extLst>
           </p:cNvPr>
@@ -2402,7 +2403,7 @@
           <p:cNvPr id="11" name="Text Placeholder 3">
             <a:extLst>
               <a:ext uri="{FF2B5EF4-FFF2-40B4-BE49-F238E27FC236}">
-                <a16:creationId xmlns:a16="http://schemas.microsoft.com/office/drawing/2014/main" xmlns="" id="{169BBA5D-EECF-4043-90D1-DD6BB50A5390}"/>
+                <a16:creationId xmlns="" xmlns:a16="http://schemas.microsoft.com/office/drawing/2014/main" id="{169BBA5D-EECF-4043-90D1-DD6BB50A5390}"/>
               </a:ext>
             </a:extLst>
           </p:cNvPr>
@@ -2479,7 +2480,7 @@
     </p:spTree>
     <p:extLst>
       <p:ext uri="{BB962C8B-B14F-4D97-AF65-F5344CB8AC3E}">
-        <p14:creationId xmlns:p14="http://schemas.microsoft.com/office/powerpoint/2010/main" xmlns="" val="42572479"/>
+        <p14:creationId xmlns="" xmlns:p14="http://schemas.microsoft.com/office/powerpoint/2010/main" val="42572479"/>
       </p:ext>
     </p:extLst>
   </p:cSld>
@@ -2487,7 +2488,7 @@
     <a:masterClrMapping/>
   </p:clrMapOvr>
   <mc:AlternateContent xmlns:mc="http://schemas.openxmlformats.org/markup-compatibility/2006">
-    <mc:Choice xmlns:p14="http://schemas.microsoft.com/office/powerpoint/2010/main" xmlns="" Requires="p14">
+    <mc:Choice xmlns="" xmlns:p14="http://schemas.microsoft.com/office/powerpoint/2010/main" Requires="p14">
       <p:transition spd="slow" p14:dur="2000" advClick="0" advTm="5000"/>
     </mc:Choice>
     <mc:Fallback>
@@ -2519,7 +2520,7 @@
           <p:cNvPr id="14" name="Picture 13">
             <a:extLst>
               <a:ext uri="{FF2B5EF4-FFF2-40B4-BE49-F238E27FC236}">
-                <a16:creationId xmlns:a16="http://schemas.microsoft.com/office/drawing/2014/main" xmlns="" id="{C7A97301-F55A-4C46-8CF8-5B32F4872318}"/>
+                <a16:creationId xmlns="" xmlns:a16="http://schemas.microsoft.com/office/drawing/2014/main" id="{C7A97301-F55A-4C46-8CF8-5B32F4872318}"/>
               </a:ext>
             </a:extLst>
           </p:cNvPr>
@@ -2549,7 +2550,7 @@
           <p:cNvPr id="5" name="Slide Number Placeholder 4">
             <a:extLst>
               <a:ext uri="{FF2B5EF4-FFF2-40B4-BE49-F238E27FC236}">
-                <a16:creationId xmlns:a16="http://schemas.microsoft.com/office/drawing/2014/main" xmlns="" id="{E766DCC1-03BD-8D48-975F-E848D408E17A}"/>
+                <a16:creationId xmlns="" xmlns:a16="http://schemas.microsoft.com/office/drawing/2014/main" id="{E766DCC1-03BD-8D48-975F-E848D408E17A}"/>
               </a:ext>
             </a:extLst>
           </p:cNvPr>
@@ -2592,7 +2593,7 @@
           <p:cNvPr id="13" name="Picture 12">
             <a:extLst>
               <a:ext uri="{FF2B5EF4-FFF2-40B4-BE49-F238E27FC236}">
-                <a16:creationId xmlns:a16="http://schemas.microsoft.com/office/drawing/2014/main" xmlns="" id="{0FC8616F-1480-6F40-B21A-CC2BA2C45BED}"/>
+                <a16:creationId xmlns="" xmlns:a16="http://schemas.microsoft.com/office/drawing/2014/main" id="{0FC8616F-1480-6F40-B21A-CC2BA2C45BED}"/>
               </a:ext>
             </a:extLst>
           </p:cNvPr>
@@ -2622,7 +2623,7 @@
           <p:cNvPr id="8" name="Text Placeholder 3">
             <a:extLst>
               <a:ext uri="{FF2B5EF4-FFF2-40B4-BE49-F238E27FC236}">
-                <a16:creationId xmlns:a16="http://schemas.microsoft.com/office/drawing/2014/main" xmlns="" id="{28EA1C4D-6527-1A41-B80D-82366B12758F}"/>
+                <a16:creationId xmlns="" xmlns:a16="http://schemas.microsoft.com/office/drawing/2014/main" id="{28EA1C4D-6527-1A41-B80D-82366B12758F}"/>
               </a:ext>
             </a:extLst>
           </p:cNvPr>
@@ -2715,7 +2716,7 @@
           <p:cNvPr id="9" name="Text Placeholder 3">
             <a:extLst>
               <a:ext uri="{FF2B5EF4-FFF2-40B4-BE49-F238E27FC236}">
-                <a16:creationId xmlns:a16="http://schemas.microsoft.com/office/drawing/2014/main" xmlns="" id="{C9953FA3-FF52-2645-8039-6B173888D710}"/>
+                <a16:creationId xmlns="" xmlns:a16="http://schemas.microsoft.com/office/drawing/2014/main" id="{C9953FA3-FF52-2645-8039-6B173888D710}"/>
               </a:ext>
             </a:extLst>
           </p:cNvPr>
@@ -2797,7 +2798,7 @@
           <p:cNvPr id="10" name="Title 1">
             <a:extLst>
               <a:ext uri="{FF2B5EF4-FFF2-40B4-BE49-F238E27FC236}">
-                <a16:creationId xmlns:a16="http://schemas.microsoft.com/office/drawing/2014/main" xmlns="" id="{4AE68015-0AAC-0C46-8F76-36477CC385DE}"/>
+                <a16:creationId xmlns="" xmlns:a16="http://schemas.microsoft.com/office/drawing/2014/main" id="{4AE68015-0AAC-0C46-8F76-36477CC385DE}"/>
               </a:ext>
             </a:extLst>
           </p:cNvPr>
@@ -2840,7 +2841,7 @@
           <p:cNvPr id="11" name="Text Placeholder 3">
             <a:extLst>
               <a:ext uri="{FF2B5EF4-FFF2-40B4-BE49-F238E27FC236}">
-                <a16:creationId xmlns:a16="http://schemas.microsoft.com/office/drawing/2014/main" xmlns="" id="{169BBA5D-EECF-4043-90D1-DD6BB50A5390}"/>
+                <a16:creationId xmlns="" xmlns:a16="http://schemas.microsoft.com/office/drawing/2014/main" id="{169BBA5D-EECF-4043-90D1-DD6BB50A5390}"/>
               </a:ext>
             </a:extLst>
           </p:cNvPr>
@@ -2917,7 +2918,7 @@
     </p:spTree>
     <p:extLst>
       <p:ext uri="{BB962C8B-B14F-4D97-AF65-F5344CB8AC3E}">
-        <p14:creationId xmlns:p14="http://schemas.microsoft.com/office/powerpoint/2010/main" xmlns="" val="2804536604"/>
+        <p14:creationId xmlns="" xmlns:p14="http://schemas.microsoft.com/office/powerpoint/2010/main" val="2804536604"/>
       </p:ext>
     </p:extLst>
   </p:cSld>
@@ -2925,7 +2926,7 @@
     <a:masterClrMapping/>
   </p:clrMapOvr>
   <mc:AlternateContent xmlns:mc="http://schemas.openxmlformats.org/markup-compatibility/2006">
-    <mc:Choice xmlns:p14="http://schemas.microsoft.com/office/powerpoint/2010/main" xmlns="" Requires="p14">
+    <mc:Choice xmlns="" xmlns:p14="http://schemas.microsoft.com/office/powerpoint/2010/main" Requires="p14">
       <p:transition spd="slow" p14:dur="2000" advClick="0" advTm="5000"/>
     </mc:Choice>
     <mc:Fallback>
@@ -2957,7 +2958,7 @@
           <p:cNvPr id="4" name="Picture 3">
             <a:extLst>
               <a:ext uri="{FF2B5EF4-FFF2-40B4-BE49-F238E27FC236}">
-                <a16:creationId xmlns:a16="http://schemas.microsoft.com/office/drawing/2014/main" xmlns="" id="{62DB0137-4B83-6740-9717-4074AFAED09F}"/>
+                <a16:creationId xmlns="" xmlns:a16="http://schemas.microsoft.com/office/drawing/2014/main" id="{62DB0137-4B83-6740-9717-4074AFAED09F}"/>
               </a:ext>
             </a:extLst>
           </p:cNvPr>
@@ -2987,7 +2988,7 @@
           <p:cNvPr id="12" name="Slide Number Placeholder 4">
             <a:extLst>
               <a:ext uri="{FF2B5EF4-FFF2-40B4-BE49-F238E27FC236}">
-                <a16:creationId xmlns:a16="http://schemas.microsoft.com/office/drawing/2014/main" xmlns="" id="{A2C3A02E-F82F-EB4D-AA11-F0AB465E4529}"/>
+                <a16:creationId xmlns="" xmlns:a16="http://schemas.microsoft.com/office/drawing/2014/main" id="{A2C3A02E-F82F-EB4D-AA11-F0AB465E4529}"/>
               </a:ext>
             </a:extLst>
           </p:cNvPr>
@@ -3030,7 +3031,7 @@
           <p:cNvPr id="9" name="Picture 8">
             <a:extLst>
               <a:ext uri="{FF2B5EF4-FFF2-40B4-BE49-F238E27FC236}">
-                <a16:creationId xmlns:a16="http://schemas.microsoft.com/office/drawing/2014/main" xmlns="" id="{59D77EAE-7535-D344-A09B-3EC1D6BA9399}"/>
+                <a16:creationId xmlns="" xmlns:a16="http://schemas.microsoft.com/office/drawing/2014/main" id="{59D77EAE-7535-D344-A09B-3EC1D6BA9399}"/>
               </a:ext>
             </a:extLst>
           </p:cNvPr>
@@ -3060,7 +3061,7 @@
           <p:cNvPr id="13" name="Title 1">
             <a:extLst>
               <a:ext uri="{FF2B5EF4-FFF2-40B4-BE49-F238E27FC236}">
-                <a16:creationId xmlns:a16="http://schemas.microsoft.com/office/drawing/2014/main" xmlns="" id="{2258039E-D7E6-874C-986C-F6066D55B1D5}"/>
+                <a16:creationId xmlns="" xmlns:a16="http://schemas.microsoft.com/office/drawing/2014/main" id="{2258039E-D7E6-874C-986C-F6066D55B1D5}"/>
               </a:ext>
             </a:extLst>
           </p:cNvPr>
@@ -3101,7 +3102,7 @@
     </p:spTree>
     <p:extLst>
       <p:ext uri="{BB962C8B-B14F-4D97-AF65-F5344CB8AC3E}">
-        <p14:creationId xmlns:p14="http://schemas.microsoft.com/office/powerpoint/2010/main" xmlns="" val="600747958"/>
+        <p14:creationId xmlns="" xmlns:p14="http://schemas.microsoft.com/office/powerpoint/2010/main" val="600747958"/>
       </p:ext>
     </p:extLst>
   </p:cSld>
@@ -3109,7 +3110,7 @@
     <a:masterClrMapping/>
   </p:clrMapOvr>
   <mc:AlternateContent xmlns:mc="http://schemas.openxmlformats.org/markup-compatibility/2006">
-    <mc:Choice xmlns:p14="http://schemas.microsoft.com/office/powerpoint/2010/main" xmlns="" Requires="p14">
+    <mc:Choice xmlns="" xmlns:p14="http://schemas.microsoft.com/office/powerpoint/2010/main" Requires="p14">
       <p:transition spd="slow" p14:dur="2000" advClick="0" advTm="5000"/>
     </mc:Choice>
     <mc:Fallback>
@@ -3141,7 +3142,7 @@
           <p:cNvPr id="4" name="Picture 3">
             <a:extLst>
               <a:ext uri="{FF2B5EF4-FFF2-40B4-BE49-F238E27FC236}">
-                <a16:creationId xmlns:a16="http://schemas.microsoft.com/office/drawing/2014/main" xmlns="" id="{62DB0137-4B83-6740-9717-4074AFAED09F}"/>
+                <a16:creationId xmlns="" xmlns:a16="http://schemas.microsoft.com/office/drawing/2014/main" id="{62DB0137-4B83-6740-9717-4074AFAED09F}"/>
               </a:ext>
             </a:extLst>
           </p:cNvPr>
@@ -3171,7 +3172,7 @@
           <p:cNvPr id="12" name="Slide Number Placeholder 4">
             <a:extLst>
               <a:ext uri="{FF2B5EF4-FFF2-40B4-BE49-F238E27FC236}">
-                <a16:creationId xmlns:a16="http://schemas.microsoft.com/office/drawing/2014/main" xmlns="" id="{A2C3A02E-F82F-EB4D-AA11-F0AB465E4529}"/>
+                <a16:creationId xmlns="" xmlns:a16="http://schemas.microsoft.com/office/drawing/2014/main" id="{A2C3A02E-F82F-EB4D-AA11-F0AB465E4529}"/>
               </a:ext>
             </a:extLst>
           </p:cNvPr>
@@ -3214,7 +3215,7 @@
           <p:cNvPr id="9" name="Picture 8">
             <a:extLst>
               <a:ext uri="{FF2B5EF4-FFF2-40B4-BE49-F238E27FC236}">
-                <a16:creationId xmlns:a16="http://schemas.microsoft.com/office/drawing/2014/main" xmlns="" id="{59D77EAE-7535-D344-A09B-3EC1D6BA9399}"/>
+                <a16:creationId xmlns="" xmlns:a16="http://schemas.microsoft.com/office/drawing/2014/main" id="{59D77EAE-7535-D344-A09B-3EC1D6BA9399}"/>
               </a:ext>
             </a:extLst>
           </p:cNvPr>
@@ -3244,7 +3245,7 @@
           <p:cNvPr id="13" name="Title 1">
             <a:extLst>
               <a:ext uri="{FF2B5EF4-FFF2-40B4-BE49-F238E27FC236}">
-                <a16:creationId xmlns:a16="http://schemas.microsoft.com/office/drawing/2014/main" xmlns="" id="{2258039E-D7E6-874C-986C-F6066D55B1D5}"/>
+                <a16:creationId xmlns="" xmlns:a16="http://schemas.microsoft.com/office/drawing/2014/main" id="{2258039E-D7E6-874C-986C-F6066D55B1D5}"/>
               </a:ext>
             </a:extLst>
           </p:cNvPr>
@@ -3287,7 +3288,7 @@
           <p:cNvPr id="3" name="Chart Placeholder 2">
             <a:extLst>
               <a:ext uri="{FF2B5EF4-FFF2-40B4-BE49-F238E27FC236}">
-                <a16:creationId xmlns:a16="http://schemas.microsoft.com/office/drawing/2014/main" xmlns="" id="{4F5843D8-3A8D-C34A-B877-27577E457994}"/>
+                <a16:creationId xmlns="" xmlns:a16="http://schemas.microsoft.com/office/drawing/2014/main" id="{4F5843D8-3A8D-C34A-B877-27577E457994}"/>
               </a:ext>
             </a:extLst>
           </p:cNvPr>
@@ -3318,7 +3319,7 @@
     </p:spTree>
     <p:extLst>
       <p:ext uri="{BB962C8B-B14F-4D97-AF65-F5344CB8AC3E}">
-        <p14:creationId xmlns:p14="http://schemas.microsoft.com/office/powerpoint/2010/main" xmlns="" val="3926419513"/>
+        <p14:creationId xmlns="" xmlns:p14="http://schemas.microsoft.com/office/powerpoint/2010/main" val="3926419513"/>
       </p:ext>
     </p:extLst>
   </p:cSld>
@@ -3326,7 +3327,7 @@
     <a:masterClrMapping/>
   </p:clrMapOvr>
   <mc:AlternateContent xmlns:mc="http://schemas.openxmlformats.org/markup-compatibility/2006">
-    <mc:Choice xmlns:p14="http://schemas.microsoft.com/office/powerpoint/2010/main" xmlns="" Requires="p14">
+    <mc:Choice xmlns="" xmlns:p14="http://schemas.microsoft.com/office/powerpoint/2010/main" Requires="p14">
       <p:transition spd="slow" p14:dur="2000" advClick="0" advTm="5000"/>
     </mc:Choice>
     <mc:Fallback>
@@ -3358,7 +3359,7 @@
           <p:cNvPr id="4" name="Picture 3">
             <a:extLst>
               <a:ext uri="{FF2B5EF4-FFF2-40B4-BE49-F238E27FC236}">
-                <a16:creationId xmlns:a16="http://schemas.microsoft.com/office/drawing/2014/main" xmlns="" id="{62DB0137-4B83-6740-9717-4074AFAED09F}"/>
+                <a16:creationId xmlns="" xmlns:a16="http://schemas.microsoft.com/office/drawing/2014/main" id="{62DB0137-4B83-6740-9717-4074AFAED09F}"/>
               </a:ext>
             </a:extLst>
           </p:cNvPr>
@@ -3388,7 +3389,7 @@
           <p:cNvPr id="12" name="Slide Number Placeholder 4">
             <a:extLst>
               <a:ext uri="{FF2B5EF4-FFF2-40B4-BE49-F238E27FC236}">
-                <a16:creationId xmlns:a16="http://schemas.microsoft.com/office/drawing/2014/main" xmlns="" id="{A2C3A02E-F82F-EB4D-AA11-F0AB465E4529}"/>
+                <a16:creationId xmlns="" xmlns:a16="http://schemas.microsoft.com/office/drawing/2014/main" id="{A2C3A02E-F82F-EB4D-AA11-F0AB465E4529}"/>
               </a:ext>
             </a:extLst>
           </p:cNvPr>
@@ -3431,7 +3432,7 @@
           <p:cNvPr id="9" name="Picture 8">
             <a:extLst>
               <a:ext uri="{FF2B5EF4-FFF2-40B4-BE49-F238E27FC236}">
-                <a16:creationId xmlns:a16="http://schemas.microsoft.com/office/drawing/2014/main" xmlns="" id="{59D77EAE-7535-D344-A09B-3EC1D6BA9399}"/>
+                <a16:creationId xmlns="" xmlns:a16="http://schemas.microsoft.com/office/drawing/2014/main" id="{59D77EAE-7535-D344-A09B-3EC1D6BA9399}"/>
               </a:ext>
             </a:extLst>
           </p:cNvPr>
@@ -3461,7 +3462,7 @@
           <p:cNvPr id="13" name="Title 1">
             <a:extLst>
               <a:ext uri="{FF2B5EF4-FFF2-40B4-BE49-F238E27FC236}">
-                <a16:creationId xmlns:a16="http://schemas.microsoft.com/office/drawing/2014/main" xmlns="" id="{2258039E-D7E6-874C-986C-F6066D55B1D5}"/>
+                <a16:creationId xmlns="" xmlns:a16="http://schemas.microsoft.com/office/drawing/2014/main" id="{2258039E-D7E6-874C-986C-F6066D55B1D5}"/>
               </a:ext>
             </a:extLst>
           </p:cNvPr>
@@ -3504,7 +3505,7 @@
           <p:cNvPr id="5" name="Table Placeholder 4">
             <a:extLst>
               <a:ext uri="{FF2B5EF4-FFF2-40B4-BE49-F238E27FC236}">
-                <a16:creationId xmlns:a16="http://schemas.microsoft.com/office/drawing/2014/main" xmlns="" id="{7CF49F7B-6D68-A545-98FE-22FBD56818DB}"/>
+                <a16:creationId xmlns="" xmlns:a16="http://schemas.microsoft.com/office/drawing/2014/main" id="{7CF49F7B-6D68-A545-98FE-22FBD56818DB}"/>
               </a:ext>
             </a:extLst>
           </p:cNvPr>
@@ -3535,7 +3536,7 @@
     </p:spTree>
     <p:extLst>
       <p:ext uri="{BB962C8B-B14F-4D97-AF65-F5344CB8AC3E}">
-        <p14:creationId xmlns:p14="http://schemas.microsoft.com/office/powerpoint/2010/main" xmlns="" val="233726489"/>
+        <p14:creationId xmlns="" xmlns:p14="http://schemas.microsoft.com/office/powerpoint/2010/main" val="233726489"/>
       </p:ext>
     </p:extLst>
   </p:cSld>
@@ -3543,7 +3544,7 @@
     <a:masterClrMapping/>
   </p:clrMapOvr>
   <mc:AlternateContent xmlns:mc="http://schemas.openxmlformats.org/markup-compatibility/2006">
-    <mc:Choice xmlns:p14="http://schemas.microsoft.com/office/powerpoint/2010/main" xmlns="" Requires="p14">
+    <mc:Choice xmlns="" xmlns:p14="http://schemas.microsoft.com/office/powerpoint/2010/main" Requires="p14">
       <p:transition spd="slow" p14:dur="2000" advClick="0" advTm="5000"/>
     </mc:Choice>
     <mc:Fallback>
@@ -3580,7 +3581,7 @@
           <p:cNvPr id="2" name="Title Placeholder 1">
             <a:extLst>
               <a:ext uri="{FF2B5EF4-FFF2-40B4-BE49-F238E27FC236}">
-                <a16:creationId xmlns:a16="http://schemas.microsoft.com/office/drawing/2014/main" xmlns="" id="{3A821DDA-2F75-B143-93FB-2C358175036C}"/>
+                <a16:creationId xmlns="" xmlns:a16="http://schemas.microsoft.com/office/drawing/2014/main" id="{3A821DDA-2F75-B143-93FB-2C358175036C}"/>
               </a:ext>
             </a:extLst>
           </p:cNvPr>
@@ -3618,7 +3619,7 @@
           <p:cNvPr id="3" name="Text Placeholder 2">
             <a:extLst>
               <a:ext uri="{FF2B5EF4-FFF2-40B4-BE49-F238E27FC236}">
-                <a16:creationId xmlns:a16="http://schemas.microsoft.com/office/drawing/2014/main" xmlns="" id="{E024324D-5F1C-BD43-893B-DCFD6AE03280}"/>
+                <a16:creationId xmlns="" xmlns:a16="http://schemas.microsoft.com/office/drawing/2014/main" id="{E024324D-5F1C-BD43-893B-DCFD6AE03280}"/>
               </a:ext>
             </a:extLst>
           </p:cNvPr>
@@ -3685,7 +3686,7 @@
           <p:cNvPr id="4" name="Date Placeholder 3">
             <a:extLst>
               <a:ext uri="{FF2B5EF4-FFF2-40B4-BE49-F238E27FC236}">
-                <a16:creationId xmlns:a16="http://schemas.microsoft.com/office/drawing/2014/main" xmlns="" id="{D53771CD-33AE-C044-A1CC-79B8BB845347}"/>
+                <a16:creationId xmlns="" xmlns:a16="http://schemas.microsoft.com/office/drawing/2014/main" id="{D53771CD-33AE-C044-A1CC-79B8BB845347}"/>
               </a:ext>
             </a:extLst>
           </p:cNvPr>
@@ -3722,7 +3723,7 @@
             <a:fld id="{FBF4D725-7178-D948-AA3E-6F5F17353337}" type="datetimeFigureOut">
               <a:rPr lang="en-US" smtClean="0"/>
               <a:pPr/>
-              <a:t>10/16/2024</a:t>
+              <a:t>10/29/2024</a:t>
             </a:fld>
             <a:endParaRPr lang="en-US"/>
           </a:p>
@@ -3733,7 +3734,7 @@
           <p:cNvPr id="5" name="Footer Placeholder 4">
             <a:extLst>
               <a:ext uri="{FF2B5EF4-FFF2-40B4-BE49-F238E27FC236}">
-                <a16:creationId xmlns:a16="http://schemas.microsoft.com/office/drawing/2014/main" xmlns="" id="{F8AD8ECD-8EE4-DE41-8FFF-8830B5D20348}"/>
+                <a16:creationId xmlns="" xmlns:a16="http://schemas.microsoft.com/office/drawing/2014/main" id="{F8AD8ECD-8EE4-DE41-8FFF-8830B5D20348}"/>
               </a:ext>
             </a:extLst>
           </p:cNvPr>
@@ -3776,7 +3777,7 @@
           <p:cNvPr id="6" name="Slide Number Placeholder 5">
             <a:extLst>
               <a:ext uri="{FF2B5EF4-FFF2-40B4-BE49-F238E27FC236}">
-                <a16:creationId xmlns:a16="http://schemas.microsoft.com/office/drawing/2014/main" xmlns="" id="{0DAC8B92-5CED-9747-9449-501492DBB804}"/>
+                <a16:creationId xmlns="" xmlns:a16="http://schemas.microsoft.com/office/drawing/2014/main" id="{0DAC8B92-5CED-9747-9449-501492DBB804}"/>
               </a:ext>
             </a:extLst>
           </p:cNvPr>
@@ -3822,7 +3823,7 @@
     </p:spTree>
     <p:extLst>
       <p:ext uri="{BB962C8B-B14F-4D97-AF65-F5344CB8AC3E}">
-        <p14:creationId xmlns:p14="http://schemas.microsoft.com/office/powerpoint/2010/main" xmlns="" val="3457181485"/>
+        <p14:creationId xmlns="" xmlns:p14="http://schemas.microsoft.com/office/powerpoint/2010/main" val="3457181485"/>
       </p:ext>
     </p:extLst>
   </p:cSld>
@@ -3839,7 +3840,7 @@
     <p:sldLayoutId id="2147483699" r:id="rId9"/>
   </p:sldLayoutIdLst>
   <mc:AlternateContent xmlns:mc="http://schemas.openxmlformats.org/markup-compatibility/2006">
-    <mc:Choice xmlns:p14="http://schemas.microsoft.com/office/powerpoint/2010/main" xmlns="" Requires="p14">
+    <mc:Choice xmlns="" xmlns:p14="http://schemas.microsoft.com/office/powerpoint/2010/main" Requires="p14">
       <p:transition spd="slow" p14:dur="2000" advClick="0" advTm="5000"/>
     </mc:Choice>
     <mc:Fallback>
@@ -4151,7 +4152,7 @@
           <p:cNvPr id="4" name="Title 3">
             <a:extLst>
               <a:ext uri="{FF2B5EF4-FFF2-40B4-BE49-F238E27FC236}">
-                <a16:creationId xmlns:a16="http://schemas.microsoft.com/office/drawing/2014/main" xmlns="" id="{C5E0BE0D-6E7F-CB36-BF6E-CB3FAB9AA219}"/>
+                <a16:creationId xmlns="" xmlns:a16="http://schemas.microsoft.com/office/drawing/2014/main" id="{C5E0BE0D-6E7F-CB36-BF6E-CB3FAB9AA219}"/>
               </a:ext>
             </a:extLst>
           </p:cNvPr>
@@ -4181,11 +4182,7 @@
             </a:r>
             <a:r>
               <a:rPr lang="en-US" dirty="0" smtClean="0"/>
-              <a:t> </a:t>
-            </a:r>
-            <a:r>
-              <a:rPr lang="en-US" dirty="0" smtClean="0"/>
-              <a:t>Python</a:t>
+              <a:t> Python</a:t>
             </a:r>
             <a:endParaRPr lang="en-US" dirty="0"/>
           </a:p>
@@ -4196,7 +4193,7 @@
           <p:cNvPr id="5" name="Text Placeholder 4">
             <a:extLst>
               <a:ext uri="{FF2B5EF4-FFF2-40B4-BE49-F238E27FC236}">
-                <a16:creationId xmlns:a16="http://schemas.microsoft.com/office/drawing/2014/main" xmlns="" id="{AEF7E49F-30CC-3ECE-B466-6B2A76D17BCA}"/>
+                <a16:creationId xmlns="" xmlns:a16="http://schemas.microsoft.com/office/drawing/2014/main" id="{AEF7E49F-30CC-3ECE-B466-6B2A76D17BCA}"/>
               </a:ext>
             </a:extLst>
           </p:cNvPr>
@@ -4223,7 +4220,7 @@
     </p:spTree>
     <p:extLst>
       <p:ext uri="{BB962C8B-B14F-4D97-AF65-F5344CB8AC3E}">
-        <p14:creationId xmlns:p14="http://schemas.microsoft.com/office/powerpoint/2010/main" xmlns="" val="3323279844"/>
+        <p14:creationId xmlns="" xmlns:p14="http://schemas.microsoft.com/office/powerpoint/2010/main" val="3323279844"/>
       </p:ext>
     </p:extLst>
   </p:cSld>
@@ -4231,7 +4228,7 @@
     <a:masterClrMapping/>
   </p:clrMapOvr>
   <mc:AlternateContent xmlns:mc="http://schemas.openxmlformats.org/markup-compatibility/2006">
-    <mc:Choice xmlns:p14="http://schemas.microsoft.com/office/powerpoint/2010/main" xmlns="" Requires="p14">
+    <mc:Choice xmlns="" xmlns:p14="http://schemas.microsoft.com/office/powerpoint/2010/main" Requires="p14">
       <p:transition spd="slow" p14:dur="2000" advClick="0" advTm="5000"/>
     </mc:Choice>
     <mc:Fallback>
@@ -4263,7 +4260,7 @@
           <p:cNvPr id="4" name="Title 3">
             <a:extLst>
               <a:ext uri="{FF2B5EF4-FFF2-40B4-BE49-F238E27FC236}">
-                <a16:creationId xmlns:a16="http://schemas.microsoft.com/office/drawing/2014/main" xmlns="" id="{7DEAF21D-E8CE-AD8B-E648-301FB7DE61DF}"/>
+                <a16:creationId xmlns="" xmlns:a16="http://schemas.microsoft.com/office/drawing/2014/main" id="{7DEAF21D-E8CE-AD8B-E648-301FB7DE61DF}"/>
               </a:ext>
             </a:extLst>
           </p:cNvPr>
@@ -4291,7 +4288,7 @@
           <p:cNvPr id="5" name="Text Placeholder 4">
             <a:extLst>
               <a:ext uri="{FF2B5EF4-FFF2-40B4-BE49-F238E27FC236}">
-                <a16:creationId xmlns:a16="http://schemas.microsoft.com/office/drawing/2014/main" xmlns="" id="{218E70D0-E766-7711-25D8-1588E232CEC8}"/>
+                <a16:creationId xmlns="" xmlns:a16="http://schemas.microsoft.com/office/drawing/2014/main" id="{218E70D0-E766-7711-25D8-1588E232CEC8}"/>
               </a:ext>
             </a:extLst>
           </p:cNvPr>
@@ -4304,13 +4301,13 @@
         </p:nvSpPr>
         <p:spPr>
           <a:xfrm>
-            <a:off x="1286935" y="2496631"/>
-            <a:ext cx="4556024" cy="2193902"/>
+            <a:off x="990600" y="2301898"/>
+            <a:ext cx="6146799" cy="3328436"/>
           </a:xfrm>
         </p:spPr>
         <p:txBody>
           <a:bodyPr>
-            <a:normAutofit fontScale="92500" lnSpcReduction="20000"/>
+            <a:normAutofit/>
           </a:bodyPr>
           <a:lstStyle/>
           <a:p>
@@ -4335,32 +4332,19 @@
             </a:r>
             <a:r>
               <a:rPr lang="en-US" dirty="0" smtClean="0"/>
-              <a:t> </a:t>
-            </a:r>
-            <a:r>
-              <a:rPr lang="en-US" dirty="0" smtClean="0"/>
-              <a:t>advantages and disadvantages </a:t>
+              <a:t> advantages and disadvantages </a:t>
             </a:r>
           </a:p>
           <a:p>
             <a:r>
               <a:rPr lang="en-US" dirty="0" smtClean="0"/>
-              <a:t>What is </a:t>
-            </a:r>
-            <a:r>
-              <a:rPr lang="en-US" dirty="0" smtClean="0"/>
-              <a:t>Python?</a:t>
-            </a:r>
-            <a:endParaRPr lang="en-US" dirty="0" smtClean="0"/>
+              <a:t>What is Python?</a:t>
+            </a:r>
           </a:p>
           <a:p>
             <a:r>
               <a:rPr lang="en-US" dirty="0" smtClean="0"/>
-              <a:t>Python advantages </a:t>
-            </a:r>
-            <a:r>
-              <a:rPr lang="en-US" dirty="0" smtClean="0"/>
-              <a:t>and disadvantages</a:t>
+              <a:t>Python advantages and disadvantages</a:t>
             </a:r>
           </a:p>
           <a:p>
@@ -4387,6 +4371,20 @@
             <a:r>
               <a:rPr lang="en-US" dirty="0" smtClean="0"/>
               <a:t>Python</a:t>
+            </a:r>
+          </a:p>
+          <a:p>
+            <a:r>
+              <a:rPr lang="en-US" dirty="0" smtClean="0"/>
+              <a:t>How can we benefit from </a:t>
+            </a:r>
+            <a:r>
+              <a:rPr lang="en-US" dirty="0" err="1" smtClean="0"/>
+              <a:t>Golang</a:t>
+            </a:r>
+            <a:r>
+              <a:rPr lang="en-US" dirty="0" smtClean="0"/>
+              <a:t>?</a:t>
             </a:r>
             <a:endParaRPr lang="en-US" dirty="0" smtClean="0"/>
           </a:p>
@@ -4402,7 +4400,7 @@
     </p:spTree>
     <p:extLst>
       <p:ext uri="{BB962C8B-B14F-4D97-AF65-F5344CB8AC3E}">
-        <p14:creationId xmlns:p14="http://schemas.microsoft.com/office/powerpoint/2010/main" xmlns="" val="2639129120"/>
+        <p14:creationId xmlns="" xmlns:p14="http://schemas.microsoft.com/office/powerpoint/2010/main" val="2639129120"/>
       </p:ext>
     </p:extLst>
   </p:cSld>
@@ -4410,7 +4408,7 @@
     <a:masterClrMapping/>
   </p:clrMapOvr>
   <mc:AlternateContent xmlns:mc="http://schemas.openxmlformats.org/markup-compatibility/2006">
-    <mc:Choice xmlns:p14="http://schemas.microsoft.com/office/powerpoint/2010/main" xmlns="" Requires="p14">
+    <mc:Choice xmlns="" xmlns:p14="http://schemas.microsoft.com/office/powerpoint/2010/main" Requires="p14">
       <p:transition spd="slow" p14:dur="2000" advClick="0" advTm="5000"/>
     </mc:Choice>
     <mc:Fallback>
@@ -4442,7 +4440,7 @@
           <p:cNvPr id="8" name="Title 7">
             <a:extLst>
               <a:ext uri="{FF2B5EF4-FFF2-40B4-BE49-F238E27FC236}">
-                <a16:creationId xmlns:a16="http://schemas.microsoft.com/office/drawing/2014/main" xmlns="" id="{8BD644B9-9C1E-39C5-E757-82FE5465A6E9}"/>
+                <a16:creationId xmlns="" xmlns:a16="http://schemas.microsoft.com/office/drawing/2014/main" id="{8BD644B9-9C1E-39C5-E757-82FE5465A6E9}"/>
               </a:ext>
             </a:extLst>
           </p:cNvPr>
@@ -4502,7 +4500,7 @@
           <p:cNvPr id="9" name="Subtitle 2">
             <a:extLst>
               <a:ext uri="{FF2B5EF4-FFF2-40B4-BE49-F238E27FC236}">
-                <a16:creationId xmlns:a16="http://schemas.microsoft.com/office/drawing/2014/main" xmlns="" id="{8F968626-82D8-2F5F-6869-21D8AD224898}"/>
+                <a16:creationId xmlns="" xmlns:a16="http://schemas.microsoft.com/office/drawing/2014/main" id="{8F968626-82D8-2F5F-6869-21D8AD224898}"/>
               </a:ext>
             </a:extLst>
           </p:cNvPr>
@@ -4566,7 +4564,7 @@
           <p:cNvPr id="4" name="Text Placeholder 4">
             <a:extLst>
               <a:ext uri="{FF2B5EF4-FFF2-40B4-BE49-F238E27FC236}">
-                <a16:creationId xmlns:a16="http://schemas.microsoft.com/office/drawing/2014/main" xmlns="" id="{218E70D0-E766-7711-25D8-1588E232CEC8}"/>
+                <a16:creationId xmlns="" xmlns:a16="http://schemas.microsoft.com/office/drawing/2014/main" id="{218E70D0-E766-7711-25D8-1588E232CEC8}"/>
               </a:ext>
             </a:extLst>
           </p:cNvPr>
@@ -4625,7 +4623,7 @@
           <p:cNvPr id="5" name="Text Placeholder 4">
             <a:extLst>
               <a:ext uri="{FF2B5EF4-FFF2-40B4-BE49-F238E27FC236}">
-                <a16:creationId xmlns:a16="http://schemas.microsoft.com/office/drawing/2014/main" xmlns="" id="{218E70D0-E766-7711-25D8-1588E232CEC8}"/>
+                <a16:creationId xmlns="" xmlns:a16="http://schemas.microsoft.com/office/drawing/2014/main" id="{218E70D0-E766-7711-25D8-1588E232CEC8}"/>
               </a:ext>
             </a:extLst>
           </p:cNvPr>
@@ -4704,11 +4702,7 @@
           <a:p>
             <a:r>
               <a:rPr lang="en-US" dirty="0" smtClean="0"/>
-              <a:t>Often </a:t>
-            </a:r>
-            <a:r>
-              <a:rPr lang="en-US" dirty="0" smtClean="0"/>
-              <a:t>referred to simply </a:t>
+              <a:t>Often referred to simply </a:t>
             </a:r>
             <a:r>
               <a:rPr lang="en-US" dirty="0" err="1" smtClean="0"/>
@@ -4793,7 +4787,7 @@
     </p:spTree>
     <p:extLst>
       <p:ext uri="{BB962C8B-B14F-4D97-AF65-F5344CB8AC3E}">
-        <p14:creationId xmlns:p14="http://schemas.microsoft.com/office/powerpoint/2010/main" xmlns="" val="479653768"/>
+        <p14:creationId xmlns="" xmlns:p14="http://schemas.microsoft.com/office/powerpoint/2010/main" val="479653768"/>
       </p:ext>
     </p:extLst>
   </p:cSld>
@@ -4801,7 +4795,7 @@
     <a:masterClrMapping/>
   </p:clrMapOvr>
   <mc:AlternateContent xmlns:mc="http://schemas.openxmlformats.org/markup-compatibility/2006">
-    <mc:Choice xmlns:p14="http://schemas.microsoft.com/office/powerpoint/2010/main" xmlns="" Requires="p14">
+    <mc:Choice xmlns="" xmlns:p14="http://schemas.microsoft.com/office/powerpoint/2010/main" Requires="p14">
       <p:transition spd="slow" p14:dur="2000" advClick="0" advTm="5000"/>
     </mc:Choice>
     <mc:Fallback>
@@ -4833,7 +4827,7 @@
           <p:cNvPr id="2" name="Title 1">
             <a:extLst>
               <a:ext uri="{FF2B5EF4-FFF2-40B4-BE49-F238E27FC236}">
-                <a16:creationId xmlns:a16="http://schemas.microsoft.com/office/drawing/2014/main" xmlns="" id="{1B418EE9-5198-ADC8-D99E-D10E479044CE}"/>
+                <a16:creationId xmlns="" xmlns:a16="http://schemas.microsoft.com/office/drawing/2014/main" id="{1B418EE9-5198-ADC8-D99E-D10E479044CE}"/>
               </a:ext>
             </a:extLst>
           </p:cNvPr>
@@ -4856,11 +4850,7 @@
           <a:p>
             <a:r>
               <a:rPr lang="en-US" sz="3200" dirty="0" smtClean="0"/>
-              <a:t>Advantages and disadvantages of </a:t>
-            </a:r>
-            <a:r>
-              <a:rPr lang="en-US" sz="3200" dirty="0" smtClean="0"/>
-              <a:t>Go</a:t>
+              <a:t>Advantages and disadvantages of Go</a:t>
             </a:r>
             <a:endParaRPr lang="en-US" sz="3200" dirty="0"/>
           </a:p>
@@ -4871,7 +4861,7 @@
           <p:cNvPr id="4" name="TextBox 3">
             <a:extLst>
               <a:ext uri="{FF2B5EF4-FFF2-40B4-BE49-F238E27FC236}">
-                <a16:creationId xmlns:a16="http://schemas.microsoft.com/office/drawing/2014/main" xmlns="" id="{221FA16E-AAC8-1A73-CCDA-27D1070D6804}"/>
+                <a16:creationId xmlns="" xmlns:a16="http://schemas.microsoft.com/office/drawing/2014/main" id="{221FA16E-AAC8-1A73-CCDA-27D1070D6804}"/>
               </a:ext>
             </a:extLst>
           </p:cNvPr>
@@ -5093,7 +5083,6 @@
                         <a:rPr lang="en-US" sz="1100" dirty="0" smtClean="0"/>
                         <a:t>: Go compiles to machine code, offering high performance and low memory consumption.</a:t>
                       </a:r>
-                      <a:endParaRPr lang="en-US" sz="1100" dirty="0" smtClean="0"/>
                     </a:p>
                   </a:txBody>
                   <a:tcPr/>
@@ -5148,7 +5137,6 @@
                         <a:rPr lang="en-US" sz="1100" dirty="0" smtClean="0"/>
                         <a:t>: Compiling to a single binary makes deploying Go applications straightforward, especially in containerized environments.</a:t>
                       </a:r>
-                      <a:endParaRPr lang="en-US" sz="1100" dirty="0" smtClean="0"/>
                     </a:p>
                   </a:txBody>
                   <a:tcPr/>
@@ -5247,7 +5235,7 @@
     </p:spTree>
     <p:extLst>
       <p:ext uri="{BB962C8B-B14F-4D97-AF65-F5344CB8AC3E}">
-        <p14:creationId xmlns:p14="http://schemas.microsoft.com/office/powerpoint/2010/main" xmlns="" val="1960280140"/>
+        <p14:creationId xmlns="" xmlns:p14="http://schemas.microsoft.com/office/powerpoint/2010/main" val="1960280140"/>
       </p:ext>
     </p:extLst>
   </p:cSld>
@@ -5255,7 +5243,7 @@
     <a:masterClrMapping/>
   </p:clrMapOvr>
   <mc:AlternateContent xmlns:mc="http://schemas.openxmlformats.org/markup-compatibility/2006">
-    <mc:Choice xmlns:p14="http://schemas.microsoft.com/office/powerpoint/2010/main" xmlns="" Requires="p14">
+    <mc:Choice xmlns="" xmlns:p14="http://schemas.microsoft.com/office/powerpoint/2010/main" Requires="p14">
       <p:transition spd="slow" p14:dur="2000" advClick="0" advTm="5000"/>
     </mc:Choice>
     <mc:Fallback>
@@ -5287,7 +5275,7 @@
           <p:cNvPr id="2" name="Title 1">
             <a:extLst>
               <a:ext uri="{FF2B5EF4-FFF2-40B4-BE49-F238E27FC236}">
-                <a16:creationId xmlns:a16="http://schemas.microsoft.com/office/drawing/2014/main" xmlns="" id="{1B418EE9-5198-ADC8-D99E-D10E479044CE}"/>
+                <a16:creationId xmlns="" xmlns:a16="http://schemas.microsoft.com/office/drawing/2014/main" id="{1B418EE9-5198-ADC8-D99E-D10E479044CE}"/>
               </a:ext>
             </a:extLst>
           </p:cNvPr>
@@ -5310,15 +5298,7 @@
           <a:p>
             <a:r>
               <a:rPr lang="en-US" sz="3200" dirty="0" smtClean="0"/>
-              <a:t>What is </a:t>
-            </a:r>
-            <a:r>
-              <a:rPr lang="en-US" sz="3200" dirty="0" smtClean="0"/>
-              <a:t>Python</a:t>
-            </a:r>
-            <a:r>
-              <a:rPr lang="en-US" sz="3200" dirty="0" smtClean="0"/>
-              <a:t>?</a:t>
+              <a:t>What is Python?</a:t>
             </a:r>
             <a:endParaRPr lang="en-US" sz="3200" dirty="0">
               <a:latin typeface="+mn-lt"/>
@@ -5331,7 +5311,7 @@
           <p:cNvPr id="4" name="TextBox 3">
             <a:extLst>
               <a:ext uri="{FF2B5EF4-FFF2-40B4-BE49-F238E27FC236}">
-                <a16:creationId xmlns:a16="http://schemas.microsoft.com/office/drawing/2014/main" xmlns="" id="{221FA16E-AAC8-1A73-CCDA-27D1070D6804}"/>
+                <a16:creationId xmlns="" xmlns:a16="http://schemas.microsoft.com/office/drawing/2014/main" id="{221FA16E-AAC8-1A73-CCDA-27D1070D6804}"/>
               </a:ext>
             </a:extLst>
           </p:cNvPr>
@@ -5394,15 +5374,7 @@
             </a:r>
             <a:r>
               <a:rPr lang="en-US" dirty="0" smtClean="0"/>
-              <a:t> is a high-level, interpreted programming language. It is designed with an emphasis on code readability and simplicity, which makes it one of the most popular and widely used programming languages today. </a:t>
-            </a:r>
-            <a:r>
-              <a:rPr lang="en-US" dirty="0" smtClean="0"/>
-              <a:t>It is </a:t>
-            </a:r>
-            <a:r>
-              <a:rPr lang="en-US" dirty="0" smtClean="0"/>
-              <a:t>suitable for a wide variety of applications, from web development and automation to data science and artificial intelligence.</a:t>
+              <a:t> is a high-level, interpreted programming language. It is designed with an emphasis on code readability and simplicity, which makes it one of the most popular and widely used programming languages today. It is suitable for a wide variety of applications, from web development and automation to data science and artificial intelligence.</a:t>
             </a:r>
             <a:endParaRPr lang="en-US" dirty="0"/>
           </a:p>
@@ -5444,7 +5416,7 @@
     </p:spTree>
     <p:extLst>
       <p:ext uri="{BB962C8B-B14F-4D97-AF65-F5344CB8AC3E}">
-        <p14:creationId xmlns:p14="http://schemas.microsoft.com/office/powerpoint/2010/main" xmlns="" val="1960280140"/>
+        <p14:creationId xmlns="" xmlns:p14="http://schemas.microsoft.com/office/powerpoint/2010/main" val="1960280140"/>
       </p:ext>
     </p:extLst>
   </p:cSld>
@@ -5452,7 +5424,7 @@
     <a:masterClrMapping/>
   </p:clrMapOvr>
   <mc:AlternateContent xmlns:mc="http://schemas.openxmlformats.org/markup-compatibility/2006">
-    <mc:Choice xmlns:p14="http://schemas.microsoft.com/office/powerpoint/2010/main" xmlns="" Requires="p14">
+    <mc:Choice xmlns="" xmlns:p14="http://schemas.microsoft.com/office/powerpoint/2010/main" Requires="p14">
       <p:transition spd="slow" p14:dur="2000" advClick="0" advTm="5000"/>
     </mc:Choice>
     <mc:Fallback>
@@ -5484,7 +5456,7 @@
           <p:cNvPr id="2" name="Title 1">
             <a:extLst>
               <a:ext uri="{FF2B5EF4-FFF2-40B4-BE49-F238E27FC236}">
-                <a16:creationId xmlns:a16="http://schemas.microsoft.com/office/drawing/2014/main" xmlns="" id="{1B418EE9-5198-ADC8-D99E-D10E479044CE}"/>
+                <a16:creationId xmlns="" xmlns:a16="http://schemas.microsoft.com/office/drawing/2014/main" id="{1B418EE9-5198-ADC8-D99E-D10E479044CE}"/>
               </a:ext>
             </a:extLst>
           </p:cNvPr>
@@ -5507,11 +5479,7 @@
           <a:p>
             <a:r>
               <a:rPr lang="en-US" sz="3200" dirty="0" smtClean="0"/>
-              <a:t>Advantages and disadvantages of </a:t>
-            </a:r>
-            <a:r>
-              <a:rPr lang="en-US" sz="3200" dirty="0" smtClean="0"/>
-              <a:t>Python</a:t>
+              <a:t>Advantages and disadvantages of Python</a:t>
             </a:r>
             <a:endParaRPr lang="en-US" sz="3200" dirty="0"/>
           </a:p>
@@ -5522,7 +5490,7 @@
           <p:cNvPr id="4" name="TextBox 3">
             <a:extLst>
               <a:ext uri="{FF2B5EF4-FFF2-40B4-BE49-F238E27FC236}">
-                <a16:creationId xmlns:a16="http://schemas.microsoft.com/office/drawing/2014/main" xmlns="" id="{221FA16E-AAC8-1A73-CCDA-27D1070D6804}"/>
+                <a16:creationId xmlns="" xmlns:a16="http://schemas.microsoft.com/office/drawing/2014/main" id="{221FA16E-AAC8-1A73-CCDA-27D1070D6804}"/>
               </a:ext>
             </a:extLst>
           </p:cNvPr>
@@ -5817,7 +5785,7 @@
     </p:spTree>
     <p:extLst>
       <p:ext uri="{BB962C8B-B14F-4D97-AF65-F5344CB8AC3E}">
-        <p14:creationId xmlns:p14="http://schemas.microsoft.com/office/powerpoint/2010/main" xmlns="" val="1960280140"/>
+        <p14:creationId xmlns="" xmlns:p14="http://schemas.microsoft.com/office/powerpoint/2010/main" val="1960280140"/>
       </p:ext>
     </p:extLst>
   </p:cSld>
@@ -5825,7 +5793,7 @@
     <a:masterClrMapping/>
   </p:clrMapOvr>
   <mc:AlternateContent xmlns:mc="http://schemas.openxmlformats.org/markup-compatibility/2006">
-    <mc:Choice xmlns:p14="http://schemas.microsoft.com/office/powerpoint/2010/main" xmlns="" Requires="p14">
+    <mc:Choice xmlns="" xmlns:p14="http://schemas.microsoft.com/office/powerpoint/2010/main" Requires="p14">
       <p:transition spd="slow" p14:dur="2000" advClick="0" advTm="5000"/>
     </mc:Choice>
     <mc:Fallback>
@@ -5857,7 +5825,7 @@
           <p:cNvPr id="2" name="Title 1">
             <a:extLst>
               <a:ext uri="{FF2B5EF4-FFF2-40B4-BE49-F238E27FC236}">
-                <a16:creationId xmlns:a16="http://schemas.microsoft.com/office/drawing/2014/main" xmlns="" id="{1B418EE9-5198-ADC8-D99E-D10E479044CE}"/>
+                <a16:creationId xmlns="" xmlns:a16="http://schemas.microsoft.com/office/drawing/2014/main" id="{1B418EE9-5198-ADC8-D99E-D10E479044CE}"/>
               </a:ext>
             </a:extLst>
           </p:cNvPr>
@@ -5880,11 +5848,7 @@
           <a:p>
             <a:r>
               <a:rPr lang="en-US" sz="3200" dirty="0" smtClean="0"/>
-              <a:t>When to use </a:t>
-            </a:r>
-            <a:r>
-              <a:rPr lang="en-US" sz="3200" dirty="0" smtClean="0"/>
-              <a:t>Go </a:t>
+              <a:t>When to use Go </a:t>
             </a:r>
             <a:r>
               <a:rPr lang="en-US" sz="3200" dirty="0" err="1" smtClean="0"/>
@@ -5894,7 +5858,6 @@
               <a:rPr lang="en-US" sz="3200" dirty="0" smtClean="0"/>
               <a:t> Python </a:t>
             </a:r>
-            <a:endParaRPr lang="en-US" sz="3200" dirty="0" smtClean="0"/>
           </a:p>
         </p:txBody>
       </p:sp>
@@ -5903,7 +5866,7 @@
           <p:cNvPr id="4" name="TextBox 3">
             <a:extLst>
               <a:ext uri="{FF2B5EF4-FFF2-40B4-BE49-F238E27FC236}">
-                <a16:creationId xmlns:a16="http://schemas.microsoft.com/office/drawing/2014/main" xmlns="" id="{221FA16E-AAC8-1A73-CCDA-27D1070D6804}"/>
+                <a16:creationId xmlns="" xmlns:a16="http://schemas.microsoft.com/office/drawing/2014/main" id="{221FA16E-AAC8-1A73-CCDA-27D1070D6804}"/>
               </a:ext>
             </a:extLst>
           </p:cNvPr>
@@ -6405,7 +6368,7 @@
     </p:spTree>
     <p:extLst>
       <p:ext uri="{BB962C8B-B14F-4D97-AF65-F5344CB8AC3E}">
-        <p14:creationId xmlns:p14="http://schemas.microsoft.com/office/powerpoint/2010/main" xmlns="" val="1960280140"/>
+        <p14:creationId xmlns="" xmlns:p14="http://schemas.microsoft.com/office/powerpoint/2010/main" val="1960280140"/>
       </p:ext>
     </p:extLst>
   </p:cSld>
@@ -6413,7 +6376,7 @@
     <a:masterClrMapping/>
   </p:clrMapOvr>
   <mc:AlternateContent xmlns:mc="http://schemas.openxmlformats.org/markup-compatibility/2006">
-    <mc:Choice xmlns:p14="http://schemas.microsoft.com/office/powerpoint/2010/main" xmlns="" Requires="p14">
+    <mc:Choice xmlns="" xmlns:p14="http://schemas.microsoft.com/office/powerpoint/2010/main" Requires="p14">
       <p:transition spd="slow" p14:dur="2000" advClick="0" advTm="5000"/>
     </mc:Choice>
     <mc:Fallback>
@@ -6442,10 +6405,567 @@
       </p:grpSpPr>
       <p:sp>
         <p:nvSpPr>
+          <p:cNvPr id="2" name="Title 1">
+            <a:extLst>
+              <a:ext uri="{FF2B5EF4-FFF2-40B4-BE49-F238E27FC236}">
+                <a16:creationId xmlns="" xmlns:a16="http://schemas.microsoft.com/office/drawing/2014/main" id="{1B418EE9-5198-ADC8-D99E-D10E479044CE}"/>
+              </a:ext>
+            </a:extLst>
+          </p:cNvPr>
+          <p:cNvSpPr>
+            <a:spLocks noGrp="1"/>
+          </p:cNvSpPr>
+          <p:nvPr>
+            <p:ph type="title"/>
+          </p:nvPr>
+        </p:nvSpPr>
+        <p:spPr>
+          <a:xfrm>
+            <a:off x="487456" y="380608"/>
+            <a:ext cx="11267471" cy="675251"/>
+          </a:xfrm>
+        </p:spPr>
+        <p:txBody>
+          <a:bodyPr/>
+          <a:lstStyle/>
+          <a:p>
+            <a:r>
+              <a:rPr lang="en-US" sz="3200" dirty="0" smtClean="0"/>
+              <a:t>How can we benefit from </a:t>
+            </a:r>
+            <a:r>
+              <a:rPr lang="en-US" sz="3200" dirty="0" err="1" smtClean="0"/>
+              <a:t>Golang</a:t>
+            </a:r>
+            <a:r>
+              <a:rPr lang="en-US" sz="3200" dirty="0" smtClean="0"/>
+              <a:t>? </a:t>
+            </a:r>
+            <a:endParaRPr lang="en-US" sz="3200" dirty="0" smtClean="0"/>
+          </a:p>
+        </p:txBody>
+      </p:sp>
+      <p:sp>
+        <p:nvSpPr>
+          <p:cNvPr id="4" name="TextBox 3">
+            <a:extLst>
+              <a:ext uri="{FF2B5EF4-FFF2-40B4-BE49-F238E27FC236}">
+                <a16:creationId xmlns="" xmlns:a16="http://schemas.microsoft.com/office/drawing/2014/main" id="{221FA16E-AAC8-1A73-CCDA-27D1070D6804}"/>
+              </a:ext>
+            </a:extLst>
+          </p:cNvPr>
+          <p:cNvSpPr txBox="1"/>
+          <p:nvPr/>
+        </p:nvSpPr>
+        <p:spPr>
+          <a:xfrm>
+            <a:off x="9958274" y="6338973"/>
+            <a:ext cx="1881605" cy="369332"/>
+          </a:xfrm>
+          <a:prstGeom prst="rect">
+            <a:avLst/>
+          </a:prstGeom>
+          <a:noFill/>
+        </p:spPr>
+        <p:txBody>
+          <a:bodyPr wrap="none" rtlCol="0">
+            <a:spAutoFit/>
+          </a:bodyPr>
+          <a:lstStyle/>
+          <a:p>
+            <a:r>
+              <a:rPr lang="en-US" i="1" dirty="0">
+                <a:solidFill>
+                  <a:schemeClr val="tx1">
+                    <a:lumMod val="50000"/>
+                  </a:schemeClr>
+                </a:solidFill>
+              </a:rPr>
+              <a:t>Mesa Confidential</a:t>
+            </a:r>
+          </a:p>
+        </p:txBody>
+      </p:sp>
+      <p:graphicFrame>
+        <p:nvGraphicFramePr>
+          <p:cNvPr id="5" name="Table 4"/>
+          <p:cNvGraphicFramePr>
+            <a:graphicFrameLocks noGrp="1"/>
+          </p:cNvGraphicFramePr>
+          <p:nvPr/>
+        </p:nvGraphicFramePr>
+        <p:xfrm>
+          <a:off x="863599" y="1098384"/>
+          <a:ext cx="10507133" cy="4752082"/>
+        </p:xfrm>
+        <a:graphic>
+          <a:graphicData uri="http://schemas.openxmlformats.org/drawingml/2006/table">
+            <a:tbl>
+              <a:tblPr firstRow="1" bandRow="1">
+                <a:tableStyleId>{5C22544A-7EE6-4342-B048-85BDC9FD1C3A}</a:tableStyleId>
+              </a:tblPr>
+              <a:tblGrid>
+                <a:gridCol w="10507133"/>
+              </a:tblGrid>
+              <a:tr h="509823">
+                <a:tc>
+                  <a:txBody>
+                    <a:bodyPr/>
+                    <a:lstStyle/>
+                    <a:p>
+                      <a:pPr algn="ctr"/>
+                      <a:r>
+                        <a:rPr lang="en-US" dirty="0" err="1" smtClean="0"/>
+                        <a:t>Golang</a:t>
+                      </a:r>
+                      <a:r>
+                        <a:rPr lang="en-US" baseline="0" dirty="0" smtClean="0"/>
+                        <a:t> benefits</a:t>
+                      </a:r>
+                      <a:endParaRPr lang="en-US" dirty="0"/>
+                    </a:p>
+                  </a:txBody>
+                  <a:tcPr/>
+                </a:tc>
+              </a:tr>
+              <a:tr h="722248">
+                <a:tc>
+                  <a:txBody>
+                    <a:bodyPr/>
+                    <a:lstStyle/>
+                    <a:p>
+                      <a:r>
+                        <a:rPr lang="en-US" sz="1400" dirty="0" err="1" smtClean="0">
+                          <a:solidFill>
+                            <a:schemeClr val="bg2">
+                              <a:lumMod val="10000"/>
+                            </a:schemeClr>
+                          </a:solidFill>
+                        </a:rPr>
+                        <a:t>Golang</a:t>
+                      </a:r>
+                      <a:r>
+                        <a:rPr lang="en-US" sz="1400" dirty="0" smtClean="0">
+                          <a:solidFill>
+                            <a:schemeClr val="bg2">
+                              <a:lumMod val="10000"/>
+                            </a:schemeClr>
+                          </a:solidFill>
+                        </a:rPr>
+                        <a:t> is a perfect fit for cloud services. As our CM system moves to the cloud, building it as modular </a:t>
+                      </a:r>
+                      <a:r>
+                        <a:rPr lang="en-US" sz="1400" dirty="0" err="1" smtClean="0">
+                          <a:solidFill>
+                            <a:schemeClr val="bg2">
+                              <a:lumMod val="10000"/>
+                            </a:schemeClr>
+                          </a:solidFill>
+                        </a:rPr>
+                        <a:t>microservices</a:t>
+                      </a:r>
+                      <a:r>
+                        <a:rPr lang="en-US" sz="1400" dirty="0" smtClean="0">
+                          <a:solidFill>
+                            <a:schemeClr val="bg2">
+                              <a:lumMod val="10000"/>
+                            </a:schemeClr>
+                          </a:solidFill>
+                        </a:rPr>
+                        <a:t> allows us to leverage </a:t>
+                      </a:r>
+                      <a:r>
+                        <a:rPr lang="en-US" sz="1400" dirty="0" err="1" smtClean="0">
+                          <a:solidFill>
+                            <a:schemeClr val="bg2">
+                              <a:lumMod val="10000"/>
+                            </a:schemeClr>
+                          </a:solidFill>
+                        </a:rPr>
+                        <a:t>Golang's</a:t>
+                      </a:r>
+                      <a:r>
+                        <a:rPr lang="en-US" sz="1400" dirty="0" smtClean="0">
+                          <a:solidFill>
+                            <a:schemeClr val="bg2">
+                              <a:lumMod val="10000"/>
+                            </a:schemeClr>
+                          </a:solidFill>
+                        </a:rPr>
+                        <a:t> high performance, scalability, and cross-platform capabilities, making it the ideal choice</a:t>
+                      </a:r>
+                      <a:endParaRPr lang="en-US" sz="1400" dirty="0">
+                        <a:solidFill>
+                          <a:schemeClr val="bg2">
+                            <a:lumMod val="10000"/>
+                          </a:schemeClr>
+                        </a:solidFill>
+                      </a:endParaRPr>
+                    </a:p>
+                  </a:txBody>
+                  <a:tcPr/>
+                </a:tc>
+              </a:tr>
+              <a:tr h="1614438">
+                <a:tc>
+                  <a:txBody>
+                    <a:bodyPr/>
+                    <a:lstStyle/>
+                    <a:p>
+                      <a:r>
+                        <a:rPr lang="en-US" sz="1400" dirty="0" err="1" smtClean="0">
+                          <a:solidFill>
+                            <a:schemeClr val="bg2">
+                              <a:lumMod val="10000"/>
+                            </a:schemeClr>
+                          </a:solidFill>
+                        </a:rPr>
+                        <a:t>Golang</a:t>
+                      </a:r>
+                      <a:r>
+                        <a:rPr lang="en-US" sz="1400" dirty="0" smtClean="0">
+                          <a:solidFill>
+                            <a:schemeClr val="bg2">
+                              <a:lumMod val="10000"/>
+                            </a:schemeClr>
+                          </a:solidFill>
+                        </a:rPr>
+                        <a:t> enables us to redesign our CM cloud system with a modular, </a:t>
+                      </a:r>
+                      <a:r>
+                        <a:rPr lang="en-US" sz="1400" dirty="0" err="1" smtClean="0">
+                          <a:solidFill>
+                            <a:schemeClr val="bg2">
+                              <a:lumMod val="10000"/>
+                            </a:schemeClr>
+                          </a:solidFill>
+                        </a:rPr>
+                        <a:t>microservices</a:t>
+                      </a:r>
+                      <a:r>
+                        <a:rPr lang="en-US" sz="1400" dirty="0" smtClean="0">
+                          <a:solidFill>
+                            <a:schemeClr val="bg2">
+                              <a:lumMod val="10000"/>
+                            </a:schemeClr>
+                          </a:solidFill>
+                        </a:rPr>
+                        <a:t> architecture, decoupling it from the monolithic application. We can build smaller, focused </a:t>
+                      </a:r>
+                      <a:r>
+                        <a:rPr lang="en-US" sz="1400" dirty="0" err="1" smtClean="0">
+                          <a:solidFill>
+                            <a:schemeClr val="bg2">
+                              <a:lumMod val="10000"/>
+                            </a:schemeClr>
+                          </a:solidFill>
+                        </a:rPr>
+                        <a:t>microservices</a:t>
+                      </a:r>
+                      <a:r>
+                        <a:rPr lang="en-US" sz="1400" dirty="0" smtClean="0">
+                          <a:solidFill>
+                            <a:schemeClr val="bg2">
+                              <a:lumMod val="10000"/>
+                            </a:schemeClr>
+                          </a:solidFill>
+                        </a:rPr>
+                        <a:t> for specific tasks like reporting, emailing, alerting, user registration, real-time dashboard updates via </a:t>
+                      </a:r>
+                      <a:r>
+                        <a:rPr lang="en-US" sz="1400" dirty="0" err="1" smtClean="0">
+                          <a:solidFill>
+                            <a:schemeClr val="bg2">
+                              <a:lumMod val="10000"/>
+                            </a:schemeClr>
+                          </a:solidFill>
+                        </a:rPr>
+                        <a:t>websocket</a:t>
+                      </a:r>
+                      <a:r>
+                        <a:rPr lang="en-US" sz="1400" dirty="0" smtClean="0">
+                          <a:solidFill>
+                            <a:schemeClr val="bg2">
+                              <a:lumMod val="10000"/>
+                            </a:schemeClr>
+                          </a:solidFill>
+                        </a:rPr>
+                        <a:t> technology, processing sensor data, database operations, and more. By connecting these individual </a:t>
+                      </a:r>
+                      <a:r>
+                        <a:rPr lang="en-US" sz="1400" dirty="0" err="1" smtClean="0">
+                          <a:solidFill>
+                            <a:schemeClr val="bg2">
+                              <a:lumMod val="10000"/>
+                            </a:schemeClr>
+                          </a:solidFill>
+                        </a:rPr>
+                        <a:t>microservices</a:t>
+                      </a:r>
+                      <a:r>
+                        <a:rPr lang="en-US" sz="1400" dirty="0" smtClean="0">
+                          <a:solidFill>
+                            <a:schemeClr val="bg2">
+                              <a:lumMod val="10000"/>
+                            </a:schemeClr>
+                          </a:solidFill>
+                        </a:rPr>
+                        <a:t>, we create a cohesive CM cloud system that is easier to maintain, troubleshoot, and update. Each </a:t>
+                      </a:r>
+                      <a:r>
+                        <a:rPr lang="en-US" sz="1400" dirty="0" err="1" smtClean="0">
+                          <a:solidFill>
+                            <a:schemeClr val="bg2">
+                              <a:lumMod val="10000"/>
+                            </a:schemeClr>
+                          </a:solidFill>
+                        </a:rPr>
+                        <a:t>microservice</a:t>
+                      </a:r>
+                      <a:r>
+                        <a:rPr lang="en-US" sz="1400" dirty="0" smtClean="0">
+                          <a:solidFill>
+                            <a:schemeClr val="bg2">
+                              <a:lumMod val="10000"/>
+                            </a:schemeClr>
+                          </a:solidFill>
+                        </a:rPr>
+                        <a:t> can be updated or fixed independently without impacting the others.</a:t>
+                      </a:r>
+                      <a:endParaRPr lang="en-US" sz="1400" dirty="0">
+                        <a:solidFill>
+                          <a:schemeClr val="bg2">
+                            <a:lumMod val="10000"/>
+                          </a:schemeClr>
+                        </a:solidFill>
+                      </a:endParaRPr>
+                    </a:p>
+                  </a:txBody>
+                  <a:tcPr/>
+                </a:tc>
+              </a:tr>
+              <a:tr h="722248">
+                <a:tc>
+                  <a:txBody>
+                    <a:bodyPr/>
+                    <a:lstStyle/>
+                    <a:p>
+                      <a:r>
+                        <a:rPr lang="en-US" sz="1400" dirty="0" smtClean="0">
+                          <a:solidFill>
+                            <a:schemeClr val="bg2">
+                              <a:lumMod val="10000"/>
+                            </a:schemeClr>
+                          </a:solidFill>
+                        </a:rPr>
+                        <a:t>Our CM cloud-based system needs to support local (on-</a:t>
+                      </a:r>
+                      <a:r>
+                        <a:rPr lang="en-US" sz="1400" dirty="0" err="1" smtClean="0">
+                          <a:solidFill>
+                            <a:schemeClr val="bg2">
+                              <a:lumMod val="10000"/>
+                            </a:schemeClr>
+                          </a:solidFill>
+                        </a:rPr>
+                        <a:t>prem</a:t>
+                      </a:r>
+                      <a:r>
+                        <a:rPr lang="en-US" sz="1400" dirty="0" smtClean="0">
+                          <a:solidFill>
+                            <a:schemeClr val="bg2">
+                              <a:lumMod val="10000"/>
+                            </a:schemeClr>
+                          </a:solidFill>
+                        </a:rPr>
+                        <a:t>) deployment. </a:t>
+                      </a:r>
+                      <a:r>
+                        <a:rPr lang="en-US" sz="1400" dirty="0" err="1" smtClean="0">
+                          <a:solidFill>
+                            <a:schemeClr val="bg2">
+                              <a:lumMod val="10000"/>
+                            </a:schemeClr>
+                          </a:solidFill>
+                        </a:rPr>
+                        <a:t>Golang's</a:t>
+                      </a:r>
+                      <a:r>
+                        <a:rPr lang="en-US" sz="1400" dirty="0" smtClean="0">
+                          <a:solidFill>
+                            <a:schemeClr val="bg2">
+                              <a:lumMod val="10000"/>
+                            </a:schemeClr>
+                          </a:solidFill>
+                        </a:rPr>
+                        <a:t> cross-platform compatibility makes it easier to deploy across different operating systems as needed.</a:t>
+                      </a:r>
+                      <a:endParaRPr lang="en-US" sz="1400" dirty="0">
+                        <a:solidFill>
+                          <a:schemeClr val="bg2">
+                            <a:lumMod val="10000"/>
+                          </a:schemeClr>
+                        </a:solidFill>
+                      </a:endParaRPr>
+                    </a:p>
+                  </a:txBody>
+                  <a:tcPr/>
+                </a:tc>
+              </a:tr>
+              <a:tr h="722248">
+                <a:tc>
+                  <a:txBody>
+                    <a:bodyPr/>
+                    <a:lstStyle/>
+                    <a:p>
+                      <a:r>
+                        <a:rPr lang="en-US" sz="1400" dirty="0" smtClean="0">
+                          <a:solidFill>
+                            <a:schemeClr val="bg2">
+                              <a:lumMod val="10000"/>
+                            </a:schemeClr>
+                          </a:solidFill>
+                        </a:rPr>
+                        <a:t>Our CM system processes large volumes of sensor data from multiple sources while performing various tasks concurrently. </a:t>
+                      </a:r>
+                      <a:r>
+                        <a:rPr lang="en-US" sz="1400" dirty="0" err="1" smtClean="0">
+                          <a:solidFill>
+                            <a:schemeClr val="bg2">
+                              <a:lumMod val="10000"/>
+                            </a:schemeClr>
+                          </a:solidFill>
+                        </a:rPr>
+                        <a:t>Golang's</a:t>
+                      </a:r>
+                      <a:r>
+                        <a:rPr lang="en-US" sz="1400" dirty="0" smtClean="0">
+                          <a:solidFill>
+                            <a:schemeClr val="bg2">
+                              <a:lumMod val="10000"/>
+                            </a:schemeClr>
+                          </a:solidFill>
+                        </a:rPr>
+                        <a:t> strong concurrency support makes it ideal for handling these simultaneous operations efficiently.</a:t>
+                      </a:r>
+                      <a:endParaRPr lang="en-US" sz="1400" dirty="0">
+                        <a:solidFill>
+                          <a:schemeClr val="bg2">
+                            <a:lumMod val="10000"/>
+                          </a:schemeClr>
+                        </a:solidFill>
+                      </a:endParaRPr>
+                    </a:p>
+                  </a:txBody>
+                  <a:tcPr/>
+                </a:tc>
+              </a:tr>
+              <a:tr h="461077">
+                <a:tc>
+                  <a:txBody>
+                    <a:bodyPr/>
+                    <a:lstStyle/>
+                    <a:p>
+                      <a:r>
+                        <a:rPr lang="en-US" sz="1400" dirty="0" smtClean="0">
+                          <a:solidFill>
+                            <a:schemeClr val="bg2">
+                              <a:lumMod val="10000"/>
+                            </a:schemeClr>
+                          </a:solidFill>
+                        </a:rPr>
+                        <a:t>Our software team will benefit greatly</a:t>
+                      </a:r>
+                      <a:r>
+                        <a:rPr lang="en-US" sz="1400" baseline="0" dirty="0" smtClean="0">
+                          <a:solidFill>
+                            <a:schemeClr val="bg2">
+                              <a:lumMod val="10000"/>
+                            </a:schemeClr>
+                          </a:solidFill>
+                        </a:rPr>
+                        <a:t> if using </a:t>
+                      </a:r>
+                      <a:r>
+                        <a:rPr lang="en-US" sz="1400" baseline="0" dirty="0" err="1" smtClean="0">
+                          <a:solidFill>
+                            <a:schemeClr val="bg2">
+                              <a:lumMod val="10000"/>
+                            </a:schemeClr>
+                          </a:solidFill>
+                        </a:rPr>
+                        <a:t>Golang</a:t>
+                      </a:r>
+                      <a:r>
+                        <a:rPr lang="en-US" sz="1400" baseline="0" dirty="0" smtClean="0">
+                          <a:solidFill>
+                            <a:schemeClr val="bg2">
+                              <a:lumMod val="10000"/>
+                            </a:schemeClr>
+                          </a:solidFill>
+                        </a:rPr>
+                        <a:t> due its strong standard library and a growing community and ecosystem.</a:t>
+                      </a:r>
+                      <a:endParaRPr lang="en-US" sz="1400" dirty="0">
+                        <a:solidFill>
+                          <a:schemeClr val="bg2">
+                            <a:lumMod val="10000"/>
+                          </a:schemeClr>
+                        </a:solidFill>
+                      </a:endParaRPr>
+                    </a:p>
+                  </a:txBody>
+                  <a:tcPr/>
+                </a:tc>
+              </a:tr>
+            </a:tbl>
+          </a:graphicData>
+        </a:graphic>
+      </p:graphicFrame>
+    </p:spTree>
+    <p:extLst>
+      <p:ext uri="{BB962C8B-B14F-4D97-AF65-F5344CB8AC3E}">
+        <p14:creationId xmlns="" xmlns:p14="http://schemas.microsoft.com/office/powerpoint/2010/main" val="1960280140"/>
+      </p:ext>
+    </p:extLst>
+  </p:cSld>
+  <p:clrMapOvr>
+    <a:masterClrMapping/>
+  </p:clrMapOvr>
+  <mc:AlternateContent xmlns:mc="http://schemas.openxmlformats.org/markup-compatibility/2006">
+    <mc:Choice xmlns="" xmlns:p14="http://schemas.microsoft.com/office/powerpoint/2010/main" Requires="p14">
+      <p:transition spd="slow" p14:dur="2000" advClick="0" advTm="5000"/>
+    </mc:Choice>
+    <mc:Fallback>
+      <p:transition spd="slow" advClick="0" advTm="5000"/>
+    </mc:Fallback>
+  </mc:AlternateContent>
+</p:sld>
+</file>
+
+<file path=ppt/slides/slide9.xml><?xml version="1.0" encoding="utf-8"?>
+<p:sld xmlns:a="http://schemas.openxmlformats.org/drawingml/2006/main" xmlns:r="http://schemas.openxmlformats.org/officeDocument/2006/relationships" xmlns:p="http://schemas.openxmlformats.org/presentationml/2006/main">
+  <p:cSld>
+    <p:spTree>
+      <p:nvGrpSpPr>
+        <p:cNvPr id="1" name=""/>
+        <p:cNvGrpSpPr/>
+        <p:nvPr/>
+      </p:nvGrpSpPr>
+      <p:grpSpPr>
+        <a:xfrm>
+          <a:off x="0" y="0"/>
+          <a:ext cx="0" cy="0"/>
+          <a:chOff x="0" y="0"/>
+          <a:chExt cx="0" cy="0"/>
+        </a:xfrm>
+      </p:grpSpPr>
+      <p:sp>
+        <p:nvSpPr>
           <p:cNvPr id="2" name="TextBox 1">
             <a:extLst>
               <a:ext uri="{FF2B5EF4-FFF2-40B4-BE49-F238E27FC236}">
-                <a16:creationId xmlns:a16="http://schemas.microsoft.com/office/drawing/2014/main" xmlns="" id="{5E8D481B-AA70-47B2-D724-B872B2D97377}"/>
+                <a16:creationId xmlns="" xmlns:a16="http://schemas.microsoft.com/office/drawing/2014/main" id="{5E8D481B-AA70-47B2-D724-B872B2D97377}"/>
               </a:ext>
             </a:extLst>
           </p:cNvPr>
@@ -6510,7 +7030,7 @@
     </p:spTree>
     <p:extLst>
       <p:ext uri="{BB962C8B-B14F-4D97-AF65-F5344CB8AC3E}">
-        <p14:creationId xmlns:p14="http://schemas.microsoft.com/office/powerpoint/2010/main" xmlns="" val="3511436495"/>
+        <p14:creationId xmlns="" xmlns:p14="http://schemas.microsoft.com/office/powerpoint/2010/main" val="3511436495"/>
       </p:ext>
     </p:extLst>
   </p:cSld>
@@ -6518,7 +7038,7 @@
     <a:masterClrMapping/>
   </p:clrMapOvr>
   <mc:AlternateContent xmlns:mc="http://schemas.openxmlformats.org/markup-compatibility/2006">
-    <mc:Choice xmlns:p14="http://schemas.microsoft.com/office/powerpoint/2010/main" xmlns="" Requires="p14">
+    <mc:Choice xmlns="" xmlns:p14="http://schemas.microsoft.com/office/powerpoint/2010/main" Requires="p14">
       <p:transition spd="slow" p14:dur="2000" advClick="0" advTm="5000"/>
     </mc:Choice>
     <mc:Fallback>
@@ -6817,7 +7337,7 @@
   <a:extraClrSchemeLst/>
   <a:extLst>
     <a:ext uri="{05A4C25C-085E-4340-85A3-A5531E510DB2}">
-      <thm15:themeFamily xmlns:thm15="http://schemas.microsoft.com/office/thememl/2012/main" xmlns="" name="18-Brand-Standards-Corporate-Template-R01  -  Repaired" id="{7628EEB4-EE5B-45F0-B1DA-E888BA5DCC7D}" vid="{48500A91-5F3F-4738-B9EF-D77D3C06827C}"/>
+      <thm15:themeFamily xmlns="" xmlns:thm15="http://schemas.microsoft.com/office/thememl/2012/main" name="18-Brand-Standards-Corporate-Template-R01  -  Repaired" id="{7628EEB4-EE5B-45F0-B1DA-E888BA5DCC7D}" vid="{48500A91-5F3F-4738-B9EF-D77D3C06827C}"/>
     </a:ext>
   </a:extLst>
 </a:theme>
@@ -7112,7 +7632,7 @@
   <a:extraClrSchemeLst/>
   <a:extLst>
     <a:ext uri="{05A4C25C-085E-4340-85A3-A5531E510DB2}">
-      <thm15:themeFamily xmlns:thm15="http://schemas.microsoft.com/office/thememl/2012/main" xmlns="" name="Office Theme" id="{62F939B6-93AF-4DB8-9C6B-D6C7DFDC589F}" vid="{4A3C46E8-61CC-4603-A589-7422A47A8E4A}"/>
+      <thm15:themeFamily xmlns="" xmlns:thm15="http://schemas.microsoft.com/office/thememl/2012/main" name="Office Theme" id="{62F939B6-93AF-4DB8-9C6B-D6C7DFDC589F}" vid="{4A3C46E8-61CC-4603-A589-7422A47A8E4A}"/>
     </a:ext>
   </a:extLst>
 </a:theme>
@@ -7407,33 +7927,13 @@
   <a:extraClrSchemeLst/>
   <a:extLst>
     <a:ext uri="{05A4C25C-085E-4340-85A3-A5531E510DB2}">
-      <thm15:themeFamily xmlns:thm15="http://schemas.microsoft.com/office/thememl/2012/main" xmlns="" name="Office Theme" id="{62F939B6-93AF-4DB8-9C6B-D6C7DFDC589F}" vid="{4A3C46E8-61CC-4603-A589-7422A47A8E4A}"/>
+      <thm15:themeFamily xmlns="" xmlns:thm15="http://schemas.microsoft.com/office/thememl/2012/main" name="Office Theme" id="{62F939B6-93AF-4DB8-9C6B-D6C7DFDC589F}" vid="{4A3C46E8-61CC-4603-A589-7422A47A8E4A}"/>
     </a:ext>
   </a:extLst>
 </a:theme>
 </file>
 
 <file path=customXml/item1.xml><?xml version="1.0" encoding="utf-8"?>
-<?mso-contentType ?>
-<FormTemplates xmlns="http://schemas.microsoft.com/sharepoint/v3/contenttype/forms">
-  <Display>DocumentLibraryForm</Display>
-  <Edit>DocumentLibraryForm</Edit>
-  <New>DocumentLibraryForm</New>
-</FormTemplates>
-</file>
-
-<file path=customXml/item2.xml><?xml version="1.0" encoding="utf-8"?>
-<p:properties xmlns:p="http://schemas.microsoft.com/office/2006/metadata/properties" xmlns:xsi="http://www.w3.org/2001/XMLSchema-instance" xmlns:pc="http://schemas.microsoft.com/office/infopath/2007/PartnerControls">
-  <documentManagement>
-    <lcf76f155ced4ddcb4097134ff3c332f xmlns="80cd682b-b40f-411e-9891-5e2a388e0f2a">
-      <Terms xmlns="http://schemas.microsoft.com/office/infopath/2007/PartnerControls"/>
-    </lcf76f155ced4ddcb4097134ff3c332f>
-    <TaxCatchAll xmlns="0a5436c3-62bb-42e4-abd1-a0a4955fdeca" xsi:nil="true"/>
-  </documentManagement>
-</p:properties>
-</file>
-
-<file path=customXml/item3.xml><?xml version="1.0" encoding="utf-8"?>
 <ct:contentTypeSchema xmlns:ct="http://schemas.microsoft.com/office/2006/metadata/contentType" xmlns:ma="http://schemas.microsoft.com/office/2006/metadata/properties/metaAttributes" ct:_="" ma:_="" ma:contentTypeName="Document" ma:contentTypeID="0x010100E88E7F3DB7B651438BE2EE6496C5288F" ma:contentTypeVersion="15" ma:contentTypeDescription="Create a new document." ma:contentTypeScope="" ma:versionID="f84292184f4f7fbb88c788eaae096a70">
   <xsd:schema xmlns:xsd="http://www.w3.org/2001/XMLSchema" xmlns:xs="http://www.w3.org/2001/XMLSchema" xmlns:p="http://schemas.microsoft.com/office/2006/metadata/properties" xmlns:ns2="80cd682b-b40f-411e-9891-5e2a388e0f2a" xmlns:ns3="0a5436c3-62bb-42e4-abd1-a0a4955fdeca" targetNamespace="http://schemas.microsoft.com/office/2006/metadata/properties" ma:root="true" ma:fieldsID="a80ffcda42bd2f74d943b42b148c0425" ns2:_="" ns3:_="">
     <xsd:import namespace="80cd682b-b40f-411e-9891-5e2a388e0f2a"/>
@@ -7664,10 +8164,41 @@
 </ct:contentTypeSchema>
 </file>
 
+<file path=customXml/item2.xml><?xml version="1.0" encoding="utf-8"?>
+<p:properties xmlns:p="http://schemas.microsoft.com/office/2006/metadata/properties" xmlns:xsi="http://www.w3.org/2001/XMLSchema-instance" xmlns:pc="http://schemas.microsoft.com/office/infopath/2007/PartnerControls">
+  <documentManagement>
+    <lcf76f155ced4ddcb4097134ff3c332f xmlns="80cd682b-b40f-411e-9891-5e2a388e0f2a">
+      <Terms xmlns="http://schemas.microsoft.com/office/infopath/2007/PartnerControls"/>
+    </lcf76f155ced4ddcb4097134ff3c332f>
+    <TaxCatchAll xmlns="0a5436c3-62bb-42e4-abd1-a0a4955fdeca" xsi:nil="true"/>
+  </documentManagement>
+</p:properties>
+</file>
+
+<file path=customXml/item3.xml><?xml version="1.0" encoding="utf-8"?>
+<?mso-contentType ?>
+<FormTemplates xmlns="http://schemas.microsoft.com/sharepoint/v3/contenttype/forms">
+  <Display>DocumentLibraryForm</Display>
+  <Edit>DocumentLibraryForm</Edit>
+  <New>DocumentLibraryForm</New>
+</FormTemplates>
+</file>
+
 <file path=customXml/itemProps1.xml><?xml version="1.0" encoding="utf-8"?>
-<ds:datastoreItem xmlns:ds="http://schemas.openxmlformats.org/officeDocument/2006/customXml" ds:itemID="{C1BF3681-C3E5-4AF6-8050-4743C0D56164}">
+<ds:datastoreItem xmlns:ds="http://schemas.openxmlformats.org/officeDocument/2006/customXml" ds:itemID="{149D4D71-E531-43EE-8F1C-8460734920B2}">
   <ds:schemaRefs>
-    <ds:schemaRef ds:uri="http://schemas.microsoft.com/sharepoint/v3/contenttype/forms"/>
+    <ds:schemaRef ds:uri="0a5436c3-62bb-42e4-abd1-a0a4955fdeca"/>
+    <ds:schemaRef ds:uri="80cd682b-b40f-411e-9891-5e2a388e0f2a"/>
+    <ds:schemaRef ds:uri="http://purl.org/dc/elements/1.1/"/>
+    <ds:schemaRef ds:uri="http://purl.org/dc/terms/"/>
+    <ds:schemaRef ds:uri="http://schemas.microsoft.com/internal/obd"/>
+    <ds:schemaRef ds:uri="http://schemas.microsoft.com/office/2006/documentManagement/types"/>
+    <ds:schemaRef ds:uri="http://schemas.microsoft.com/office/2006/metadata/contentType"/>
+    <ds:schemaRef ds:uri="http://schemas.microsoft.com/office/2006/metadata/properties"/>
+    <ds:schemaRef ds:uri="http://schemas.microsoft.com/office/2006/metadata/properties/metaAttributes"/>
+    <ds:schemaRef ds:uri="http://schemas.microsoft.com/office/infopath/2007/PartnerControls"/>
+    <ds:schemaRef ds:uri="http://schemas.openxmlformats.org/package/2006/metadata/core-properties"/>
+    <ds:schemaRef ds:uri="http://www.w3.org/2001/XMLSchema"/>
   </ds:schemaRefs>
 </ds:datastoreItem>
 </file>
@@ -7690,20 +8221,9 @@
 </file>
 
 <file path=customXml/itemProps3.xml><?xml version="1.0" encoding="utf-8"?>
-<ds:datastoreItem xmlns:ds="http://schemas.openxmlformats.org/officeDocument/2006/customXml" ds:itemID="{149D4D71-E531-43EE-8F1C-8460734920B2}">
+<ds:datastoreItem xmlns:ds="http://schemas.openxmlformats.org/officeDocument/2006/customXml" ds:itemID="{C1BF3681-C3E5-4AF6-8050-4743C0D56164}">
   <ds:schemaRefs>
-    <ds:schemaRef ds:uri="0a5436c3-62bb-42e4-abd1-a0a4955fdeca"/>
-    <ds:schemaRef ds:uri="80cd682b-b40f-411e-9891-5e2a388e0f2a"/>
-    <ds:schemaRef ds:uri="http://purl.org/dc/elements/1.1/"/>
-    <ds:schemaRef ds:uri="http://purl.org/dc/terms/"/>
-    <ds:schemaRef ds:uri="http://schemas.microsoft.com/internal/obd"/>
-    <ds:schemaRef ds:uri="http://schemas.microsoft.com/office/2006/documentManagement/types"/>
-    <ds:schemaRef ds:uri="http://schemas.microsoft.com/office/2006/metadata/contentType"/>
-    <ds:schemaRef ds:uri="http://schemas.microsoft.com/office/2006/metadata/properties"/>
-    <ds:schemaRef ds:uri="http://schemas.microsoft.com/office/2006/metadata/properties/metaAttributes"/>
-    <ds:schemaRef ds:uri="http://schemas.microsoft.com/office/infopath/2007/PartnerControls"/>
-    <ds:schemaRef ds:uri="http://schemas.openxmlformats.org/package/2006/metadata/core-properties"/>
-    <ds:schemaRef ds:uri="http://www.w3.org/2001/XMLSchema"/>
+    <ds:schemaRef ds:uri="http://schemas.microsoft.com/sharepoint/v3/contenttype/forms"/>
   </ds:schemaRefs>
 </ds:datastoreItem>
 </file>
</xml_diff>